<commit_message>
Plan de proyecto practicamente acabado
Falta meter los archivos externos a mostrar y el punto 8 (Apéndice)
</commit_message>
<xml_diff>
--- a/Plan de proyecto.pptx
+++ b/Plan de proyecto.pptx
@@ -5,10 +5,10 @@
     <p:sldMasterId id="2147483648" r:id="rId1"/>
   </p:sldMasterIdLst>
   <p:notesMasterIdLst>
-    <p:notesMasterId r:id="rId31"/>
+    <p:notesMasterId r:id="rId37"/>
   </p:notesMasterIdLst>
   <p:handoutMasterIdLst>
-    <p:handoutMasterId r:id="rId32"/>
+    <p:handoutMasterId r:id="rId38"/>
   </p:handoutMasterIdLst>
   <p:sldIdLst>
     <p:sldId id="256" r:id="rId2"/>
@@ -40,6 +40,12 @@
     <p:sldId id="295" r:id="rId28"/>
     <p:sldId id="296" r:id="rId29"/>
     <p:sldId id="297" r:id="rId30"/>
+    <p:sldId id="298" r:id="rId31"/>
+    <p:sldId id="299" r:id="rId32"/>
+    <p:sldId id="301" r:id="rId33"/>
+    <p:sldId id="300" r:id="rId34"/>
+    <p:sldId id="302" r:id="rId35"/>
+    <p:sldId id="303" r:id="rId36"/>
   </p:sldIdLst>
   <p:sldSz cx="24384000" cy="13716000"/>
   <p:notesSz cx="6858000" cy="9144000"/>
@@ -21314,50 +21320,46 @@
             <a:endParaRPr lang="es-ES" dirty="0"/>
           </a:p>
           <a:p>
-            <a:pPr lvl="0" fontAlgn="base"/>
-            <a:r>
-              <a:rPr lang="es-ES_tradnl" u="sng" dirty="0"/>
-              <a:t>Análisis</a:t>
-            </a:r>
+            <a:pPr marL="800100" lvl="0" indent="-342900" fontAlgn="base">
+              <a:buFont typeface="Arial" panose="020B0604020202020204" pitchFamily="34" charset="0"/>
+              <a:buChar char="•"/>
+            </a:pPr>
             <a:r>
               <a:rPr lang="es-ES_tradnl" dirty="0"/>
-              <a:t>: recogemos la información, realizamos los requisitos y definimos los usuarios.</a:t>
+              <a:t>Análisis: recogemos la información, realizamos los requisitos y definimos los usuarios.</a:t>
             </a:r>
             <a:endParaRPr lang="es-ES" dirty="0"/>
           </a:p>
           <a:p>
-            <a:pPr lvl="0" fontAlgn="base"/>
-            <a:r>
-              <a:rPr lang="es-ES_tradnl" u="sng" dirty="0"/>
-              <a:t>Diseño</a:t>
-            </a:r>
+            <a:pPr marL="800100" lvl="0" indent="-342900" fontAlgn="base">
+              <a:buFont typeface="Arial" panose="020B0604020202020204" pitchFamily="34" charset="0"/>
+              <a:buChar char="•"/>
+            </a:pPr>
             <a:r>
               <a:rPr lang="es-ES_tradnl" dirty="0"/>
-              <a:t>: realizamos un diseño del entorno gráfico y definimos los estilos que va a tener el programa.</a:t>
+              <a:t>Diseño: realizamos un diseño del entorno gráfico y definimos los estilos que va a tener el programa.</a:t>
             </a:r>
             <a:endParaRPr lang="es-ES" dirty="0"/>
           </a:p>
           <a:p>
-            <a:pPr lvl="0" fontAlgn="base"/>
-            <a:r>
-              <a:rPr lang="es-ES_tradnl" u="sng" dirty="0"/>
-              <a:t>Documentación</a:t>
-            </a:r>
+            <a:pPr marL="800100" lvl="0" indent="-342900" fontAlgn="base">
+              <a:buFont typeface="Arial" panose="020B0604020202020204" pitchFamily="34" charset="0"/>
+              <a:buChar char="•"/>
+            </a:pPr>
             <a:r>
               <a:rPr lang="es-ES_tradnl" dirty="0"/>
-              <a:t>: recopilamos toda la información en el SRS que nos servirá para realizar el diseño del programa.</a:t>
+              <a:t>Documentación: recopilamos toda la información en el SRS que nos servirá para realizar el diseño del programa.</a:t>
             </a:r>
             <a:endParaRPr lang="es-ES" dirty="0"/>
           </a:p>
           <a:p>
-            <a:pPr lvl="0" fontAlgn="base"/>
-            <a:r>
-              <a:rPr lang="es-ES_tradnl" u="sng" dirty="0"/>
-              <a:t>Construcción</a:t>
-            </a:r>
+            <a:pPr marL="800100" lvl="0" indent="-342900" fontAlgn="base">
+              <a:buFont typeface="Arial" panose="020B0604020202020204" pitchFamily="34" charset="0"/>
+              <a:buChar char="•"/>
+            </a:pPr>
             <a:r>
               <a:rPr lang="es-ES_tradnl" dirty="0"/>
-              <a:t>: realizamos la codificación del programa, las pruebas necesarias y el ensamblaje de todas las partes del proyecto.</a:t>
+              <a:t>Construcción: realizamos la codificación del programa, las pruebas necesarias y el ensamblaje de todas las partes del proyecto.</a:t>
             </a:r>
             <a:endParaRPr lang="es-ES" dirty="0"/>
           </a:p>
@@ -25183,9 +25185,9 @@
         </p:nvGrpSpPr>
         <p:grpSpPr>
           <a:xfrm>
-            <a:off x="10867601" y="2512437"/>
+            <a:off x="10903758" y="2797739"/>
             <a:ext cx="4962094" cy="771400"/>
-            <a:chOff x="-492532" y="79108"/>
+            <a:chOff x="-436210" y="364410"/>
             <a:chExt cx="7729511" cy="771399"/>
           </a:xfrm>
         </p:grpSpPr>
@@ -25197,7 +25199,7 @@
           </p:nvSpPr>
           <p:spPr>
             <a:xfrm>
-              <a:off x="-492532" y="79108"/>
+              <a:off x="-436210" y="364410"/>
               <a:ext cx="7149288" cy="771399"/>
             </a:xfrm>
             <a:prstGeom prst="roundRect">
@@ -25249,7 +25251,7 @@
           </p:nvSpPr>
           <p:spPr>
             <a:xfrm>
-              <a:off x="172709" y="182679"/>
+              <a:off x="229031" y="467981"/>
               <a:ext cx="7064270" cy="564256"/>
             </a:xfrm>
             <a:prstGeom prst="rect">
@@ -27445,6 +27447,3643 @@
     <p:extLst>
       <p:ext uri="{BB962C8B-B14F-4D97-AF65-F5344CB8AC3E}">
         <p14:creationId xmlns:p14="http://schemas.microsoft.com/office/powerpoint/2010/main" val="3871056862"/>
+      </p:ext>
+    </p:extLst>
+  </p:cSld>
+  <p:clrMapOvr>
+    <a:masterClrMapping/>
+  </p:clrMapOvr>
+  <p:transition spd="med"/>
+</p:sld>
+</file>
+
+<file path=ppt/slides/slide30.xml><?xml version="1.0" encoding="utf-8"?>
+<p:sld xmlns:a="http://schemas.openxmlformats.org/drawingml/2006/main" xmlns:r="http://schemas.openxmlformats.org/officeDocument/2006/relationships" xmlns:p="http://schemas.openxmlformats.org/presentationml/2006/main">
+  <p:cSld>
+    <p:spTree>
+      <p:nvGrpSpPr>
+        <p:cNvPr id="1" name=""/>
+        <p:cNvGrpSpPr/>
+        <p:nvPr/>
+      </p:nvGrpSpPr>
+      <p:grpSpPr>
+        <a:xfrm>
+          <a:off x="0" y="0"/>
+          <a:ext cx="0" cy="0"/>
+          <a:chOff x="0" y="0"/>
+          <a:chExt cx="0" cy="0"/>
+        </a:xfrm>
+      </p:grpSpPr>
+      <p:pic>
+        <p:nvPicPr>
+          <p:cNvPr id="194" name="pasted-image.tiff"/>
+          <p:cNvPicPr>
+            <a:picLocks noChangeAspect="1"/>
+          </p:cNvPicPr>
+          <p:nvPr/>
+        </p:nvPicPr>
+        <p:blipFill>
+          <a:blip r:embed="rId2">
+            <a:extLst/>
+          </a:blip>
+          <a:stretch>
+            <a:fillRect/>
+          </a:stretch>
+        </p:blipFill>
+        <p:spPr>
+          <a:xfrm>
+            <a:off x="-816206" y="-529723"/>
+            <a:ext cx="26829216" cy="2397845"/>
+          </a:xfrm>
+          <a:prstGeom prst="rect">
+            <a:avLst/>
+          </a:prstGeom>
+          <a:ln w="12700">
+            <a:miter lim="400000"/>
+          </a:ln>
+        </p:spPr>
+      </p:pic>
+      <p:pic>
+        <p:nvPicPr>
+          <p:cNvPr id="195" name="pasted-image.tiff"/>
+          <p:cNvPicPr>
+            <a:picLocks noChangeAspect="1"/>
+          </p:cNvPicPr>
+          <p:nvPr/>
+        </p:nvPicPr>
+        <p:blipFill>
+          <a:blip r:embed="rId3">
+            <a:extLst/>
+          </a:blip>
+          <a:stretch>
+            <a:fillRect/>
+          </a:stretch>
+        </p:blipFill>
+        <p:spPr>
+          <a:xfrm>
+            <a:off x="20120528" y="596900"/>
+            <a:ext cx="2416329" cy="766806"/>
+          </a:xfrm>
+          <a:prstGeom prst="rect">
+            <a:avLst/>
+          </a:prstGeom>
+          <a:ln w="12700">
+            <a:miter lim="400000"/>
+          </a:ln>
+        </p:spPr>
+      </p:pic>
+      <p:sp>
+        <p:nvSpPr>
+          <p:cNvPr id="197" name="Shape 197"/>
+          <p:cNvSpPr/>
+          <p:nvPr/>
+        </p:nvSpPr>
+        <p:spPr>
+          <a:xfrm>
+            <a:off x="1044066" y="500292"/>
+            <a:ext cx="10746532" cy="795089"/>
+          </a:xfrm>
+          <a:prstGeom prst="rect">
+            <a:avLst/>
+          </a:prstGeom>
+          <a:ln w="12700">
+            <a:miter lim="400000"/>
+          </a:ln>
+          <a:extLst>
+            <a:ext uri="{C572A759-6A51-4108-AA02-DFA0A04FC94B}">
+              <ma14:wrappingTextBoxFlag xmlns="" xmlns:ma14="http://schemas.microsoft.com/office/mac/drawingml/2011/main" val="1"/>
+            </a:ext>
+          </a:extLst>
+        </p:spPr>
+        <p:txBody>
+          <a:bodyPr wrap="none" lIns="50800" tIns="50800" rIns="50800" bIns="50800" anchor="ctr">
+            <a:spAutoFit/>
+          </a:bodyPr>
+          <a:lstStyle>
+            <a:lvl1pPr>
+              <a:defRPr sz="4500">
+                <a:solidFill>
+                  <a:srgbClr val="FFFFFF"/>
+                </a:solidFill>
+                <a:latin typeface="Helvetica Neue"/>
+                <a:ea typeface="Helvetica Neue"/>
+                <a:cs typeface="Helvetica Neue"/>
+                <a:sym typeface="Helvetica Neue"/>
+              </a:defRPr>
+            </a:lvl1pPr>
+          </a:lstStyle>
+          <a:p>
+            <a:r>
+              <a:rPr lang="es-ES" dirty="0"/>
+              <a:t>7. Mecanismos de seguimiento y control </a:t>
+            </a:r>
+            <a:endParaRPr dirty="0"/>
+          </a:p>
+        </p:txBody>
+      </p:sp>
+      <p:grpSp>
+        <p:nvGrpSpPr>
+          <p:cNvPr id="200" name="Group 200"/>
+          <p:cNvGrpSpPr/>
+          <p:nvPr/>
+        </p:nvGrpSpPr>
+        <p:grpSpPr>
+          <a:xfrm>
+            <a:off x="8691877" y="3243524"/>
+            <a:ext cx="10410722" cy="771400"/>
+            <a:chOff x="-3570267" y="1789586"/>
+            <a:chExt cx="16216902" cy="771399"/>
+          </a:xfrm>
+        </p:grpSpPr>
+        <p:sp>
+          <p:nvSpPr>
+            <p:cNvPr id="198" name="Shape 198"/>
+            <p:cNvSpPr/>
+            <p:nvPr/>
+          </p:nvSpPr>
+          <p:spPr>
+            <a:xfrm>
+              <a:off x="-3570267" y="1789586"/>
+              <a:ext cx="13823051" cy="771399"/>
+            </a:xfrm>
+            <a:prstGeom prst="roundRect">
+              <a:avLst>
+                <a:gd name="adj" fmla="val 33536"/>
+              </a:avLst>
+            </a:prstGeom>
+            <a:solidFill>
+              <a:srgbClr val="BA6B89"/>
+            </a:solidFill>
+            <a:ln w="12700" cap="flat">
+              <a:noFill/>
+              <a:miter lim="400000"/>
+            </a:ln>
+            <a:effectLst/>
+          </p:spPr>
+          <p:txBody>
+            <a:bodyPr wrap="square" lIns="50800" tIns="50800" rIns="50800" bIns="50800" numCol="1" anchor="ctr">
+              <a:noAutofit/>
+            </a:bodyPr>
+            <a:lstStyle/>
+            <a:p>
+              <a:pPr algn="ctr">
+                <a:lnSpc>
+                  <a:spcPct val="80000"/>
+                </a:lnSpc>
+                <a:spcBef>
+                  <a:spcPts val="0"/>
+                </a:spcBef>
+                <a:defRPr sz="4000" cap="all">
+                  <a:solidFill>
+                    <a:srgbClr val="FFFFFF"/>
+                  </a:solidFill>
+                  <a:latin typeface="+mn-lt"/>
+                  <a:ea typeface="+mn-ea"/>
+                  <a:cs typeface="+mn-cs"/>
+                  <a:sym typeface="DIN Condensed"/>
+                </a:defRPr>
+              </a:pPr>
+              <a:endParaRPr dirty="0"/>
+            </a:p>
+          </p:txBody>
+        </p:sp>
+        <p:sp>
+          <p:nvSpPr>
+            <p:cNvPr id="199" name="Shape 199"/>
+            <p:cNvSpPr/>
+            <p:nvPr/>
+          </p:nvSpPr>
+          <p:spPr>
+            <a:xfrm>
+              <a:off x="-2905026" y="1893155"/>
+              <a:ext cx="15551661" cy="564256"/>
+            </a:xfrm>
+            <a:prstGeom prst="rect">
+              <a:avLst/>
+            </a:prstGeom>
+            <a:noFill/>
+            <a:ln w="12700" cap="flat">
+              <a:noFill/>
+              <a:miter lim="400000"/>
+            </a:ln>
+            <a:effectLst/>
+            <a:extLst>
+              <a:ext uri="{C572A759-6A51-4108-AA02-DFA0A04FC94B}">
+                <ma14:wrappingTextBoxFlag xmlns="" xmlns:ma14="http://schemas.microsoft.com/office/mac/drawingml/2011/main" val="1"/>
+              </a:ext>
+            </a:extLst>
+          </p:spPr>
+          <p:txBody>
+            <a:bodyPr wrap="square" lIns="50800" tIns="50800" rIns="50800" bIns="50800" numCol="1" anchor="ctr">
+              <a:spAutoFit/>
+            </a:bodyPr>
+            <a:lstStyle>
+              <a:lvl1pPr>
+                <a:defRPr>
+                  <a:solidFill>
+                    <a:srgbClr val="FFFFFF"/>
+                  </a:solidFill>
+                </a:defRPr>
+              </a:lvl1pPr>
+            </a:lstStyle>
+            <a:p>
+              <a:r>
+                <a:rPr lang="es-ES" dirty="0"/>
+                <a:t>1 Garantía de calidad y control (Plan de Calidad)</a:t>
+              </a:r>
+              <a:endParaRPr dirty="0"/>
+            </a:p>
+          </p:txBody>
+        </p:sp>
+      </p:grpSp>
+      <p:sp>
+        <p:nvSpPr>
+          <p:cNvPr id="16" name="Shape 212"/>
+          <p:cNvSpPr/>
+          <p:nvPr/>
+        </p:nvSpPr>
+        <p:spPr>
+          <a:xfrm>
+            <a:off x="4564490" y="2490329"/>
+            <a:ext cx="16604319" cy="10196971"/>
+          </a:xfrm>
+          <a:prstGeom prst="roundRect">
+            <a:avLst>
+              <a:gd name="adj" fmla="val 7944"/>
+            </a:avLst>
+          </a:prstGeom>
+          <a:ln w="50800">
+            <a:solidFill>
+              <a:srgbClr val="5B5854"/>
+            </a:solidFill>
+            <a:miter lim="400000"/>
+          </a:ln>
+        </p:spPr>
+        <p:txBody>
+          <a:bodyPr lIns="50800" tIns="50800" rIns="50800" bIns="50800" anchor="ctr"/>
+          <a:lstStyle/>
+          <a:p>
+            <a:pPr algn="ctr">
+              <a:lnSpc>
+                <a:spcPct val="80000"/>
+              </a:lnSpc>
+              <a:spcBef>
+                <a:spcPts val="0"/>
+              </a:spcBef>
+              <a:defRPr sz="100" cap="all">
+                <a:solidFill>
+                  <a:srgbClr val="FFFFFF"/>
+                </a:solidFill>
+                <a:latin typeface="+mn-lt"/>
+                <a:ea typeface="+mn-ea"/>
+                <a:cs typeface="+mn-cs"/>
+                <a:sym typeface="DIN Condensed"/>
+              </a:defRPr>
+            </a:pPr>
+            <a:endParaRPr/>
+          </a:p>
+        </p:txBody>
+      </p:sp>
+      <p:sp>
+        <p:nvSpPr>
+          <p:cNvPr id="3" name="Marcador de número de diapositiva 2"/>
+          <p:cNvSpPr>
+            <a:spLocks noGrp="1"/>
+          </p:cNvSpPr>
+          <p:nvPr>
+            <p:ph type="sldNum" sz="quarter" idx="2"/>
+          </p:nvPr>
+        </p:nvSpPr>
+        <p:spPr/>
+        <p:txBody>
+          <a:bodyPr/>
+          <a:lstStyle/>
+          <a:p>
+            <a:fld id="{86CB4B4D-7CA3-9044-876B-883B54F8677D}" type="slidenum">
+              <a:rPr lang="es-ES" smtClean="0"/>
+              <a:t>30</a:t>
+            </a:fld>
+            <a:endParaRPr lang="es-ES"/>
+          </a:p>
+        </p:txBody>
+      </p:sp>
+      <p:sp>
+        <p:nvSpPr>
+          <p:cNvPr id="6" name="Rectángulo 5"/>
+          <p:cNvSpPr/>
+          <p:nvPr/>
+        </p:nvSpPr>
+        <p:spPr>
+          <a:xfrm>
+            <a:off x="6892901" y="5313387"/>
+            <a:ext cx="12192000" cy="477054"/>
+          </a:xfrm>
+          <a:prstGeom prst="rect">
+            <a:avLst/>
+          </a:prstGeom>
+        </p:spPr>
+        <p:txBody>
+          <a:bodyPr>
+            <a:spAutoFit/>
+          </a:bodyPr>
+          <a:lstStyle/>
+          <a:p>
+            <a:r>
+              <a:rPr lang="es-ES" sz="2500" dirty="0">
+                <a:solidFill>
+                  <a:srgbClr val="00000A"/>
+                </a:solidFill>
+                <a:uFill>
+                  <a:solidFill>
+                    <a:srgbClr val="00000A"/>
+                  </a:solidFill>
+                </a:uFill>
+                <a:latin typeface="Helvetica Neue"/>
+                <a:ea typeface="Helvetica Neue"/>
+                <a:cs typeface="Helvetica Neue"/>
+              </a:rPr>
+              <a:t>La herramienta de versionado que utilizaremos será Git y el servidor GitHub.</a:t>
+            </a:r>
+          </a:p>
+        </p:txBody>
+      </p:sp>
+      <p:sp>
+        <p:nvSpPr>
+          <p:cNvPr id="8" name="Rectángulo 7"/>
+          <p:cNvSpPr/>
+          <p:nvPr/>
+        </p:nvSpPr>
+        <p:spPr>
+          <a:xfrm>
+            <a:off x="6892901" y="6412648"/>
+            <a:ext cx="12192000" cy="3657411"/>
+          </a:xfrm>
+          <a:prstGeom prst="rect">
+            <a:avLst/>
+          </a:prstGeom>
+        </p:spPr>
+        <p:txBody>
+          <a:bodyPr>
+            <a:spAutoFit/>
+          </a:bodyPr>
+          <a:lstStyle/>
+          <a:p>
+            <a:r>
+              <a:rPr lang="es-ES" sz="2500" dirty="0">
+                <a:solidFill>
+                  <a:srgbClr val="00000A"/>
+                </a:solidFill>
+                <a:uFill>
+                  <a:solidFill>
+                    <a:srgbClr val="00000A"/>
+                  </a:solidFill>
+                </a:uFill>
+                <a:latin typeface="Helvetica Neue"/>
+                <a:ea typeface="Helvetica Neue"/>
+                <a:cs typeface="Helvetica Neue"/>
+              </a:rPr>
+              <a:t>Para conseguir crear software de calidad realizaremos revisiones técnicas formales luego de cada tarea finalizada. </a:t>
+            </a:r>
+          </a:p>
+          <a:p>
+            <a:r>
+              <a:rPr lang="es-ES" sz="2500" dirty="0">
+                <a:solidFill>
+                  <a:srgbClr val="00000A"/>
+                </a:solidFill>
+                <a:uFill>
+                  <a:solidFill>
+                    <a:srgbClr val="00000A"/>
+                  </a:solidFill>
+                </a:uFill>
+                <a:latin typeface="Helvetica Neue"/>
+                <a:ea typeface="Helvetica Neue"/>
+                <a:cs typeface="Helvetica Neue"/>
+              </a:rPr>
+              <a:t>Se designará a alguien que revise el trabajo hecho por los otros integrantes del grupo y así poder encontrar errores o simples modificaciones para que tenga más sentido la tarea.</a:t>
+            </a:r>
+          </a:p>
+          <a:p>
+            <a:r>
+              <a:rPr lang="es-ES" sz="2500" dirty="0">
+                <a:solidFill>
+                  <a:srgbClr val="00000A"/>
+                </a:solidFill>
+                <a:uFill>
+                  <a:solidFill>
+                    <a:srgbClr val="00000A"/>
+                  </a:solidFill>
+                </a:uFill>
+                <a:latin typeface="Helvetica Neue"/>
+                <a:ea typeface="Helvetica Neue"/>
+                <a:cs typeface="Helvetica Neue"/>
+              </a:rPr>
+              <a:t>A partir de aquí, en la siguiente reunión se tendrán que exponer las modificaciones realizadas y sus consecuencias.</a:t>
+            </a:r>
+          </a:p>
+        </p:txBody>
+      </p:sp>
+    </p:spTree>
+    <p:extLst>
+      <p:ext uri="{BB962C8B-B14F-4D97-AF65-F5344CB8AC3E}">
+        <p14:creationId xmlns:p14="http://schemas.microsoft.com/office/powerpoint/2010/main" val="69701862"/>
+      </p:ext>
+    </p:extLst>
+  </p:cSld>
+  <p:clrMapOvr>
+    <a:masterClrMapping/>
+  </p:clrMapOvr>
+  <p:transition spd="med"/>
+</p:sld>
+</file>
+
+<file path=ppt/slides/slide31.xml><?xml version="1.0" encoding="utf-8"?>
+<p:sld xmlns:a="http://schemas.openxmlformats.org/drawingml/2006/main" xmlns:r="http://schemas.openxmlformats.org/officeDocument/2006/relationships" xmlns:p="http://schemas.openxmlformats.org/presentationml/2006/main">
+  <p:cSld>
+    <p:spTree>
+      <p:nvGrpSpPr>
+        <p:cNvPr id="1" name=""/>
+        <p:cNvGrpSpPr/>
+        <p:nvPr/>
+      </p:nvGrpSpPr>
+      <p:grpSpPr>
+        <a:xfrm>
+          <a:off x="0" y="0"/>
+          <a:ext cx="0" cy="0"/>
+          <a:chOff x="0" y="0"/>
+          <a:chExt cx="0" cy="0"/>
+        </a:xfrm>
+      </p:grpSpPr>
+      <p:pic>
+        <p:nvPicPr>
+          <p:cNvPr id="194" name="pasted-image.tiff"/>
+          <p:cNvPicPr>
+            <a:picLocks noChangeAspect="1"/>
+          </p:cNvPicPr>
+          <p:nvPr/>
+        </p:nvPicPr>
+        <p:blipFill>
+          <a:blip r:embed="rId2">
+            <a:extLst/>
+          </a:blip>
+          <a:stretch>
+            <a:fillRect/>
+          </a:stretch>
+        </p:blipFill>
+        <p:spPr>
+          <a:xfrm>
+            <a:off x="-816206" y="-529723"/>
+            <a:ext cx="26829216" cy="2397845"/>
+          </a:xfrm>
+          <a:prstGeom prst="rect">
+            <a:avLst/>
+          </a:prstGeom>
+          <a:ln w="12700">
+            <a:miter lim="400000"/>
+          </a:ln>
+        </p:spPr>
+      </p:pic>
+      <p:pic>
+        <p:nvPicPr>
+          <p:cNvPr id="195" name="pasted-image.tiff"/>
+          <p:cNvPicPr>
+            <a:picLocks noChangeAspect="1"/>
+          </p:cNvPicPr>
+          <p:nvPr/>
+        </p:nvPicPr>
+        <p:blipFill>
+          <a:blip r:embed="rId3">
+            <a:extLst/>
+          </a:blip>
+          <a:stretch>
+            <a:fillRect/>
+          </a:stretch>
+        </p:blipFill>
+        <p:spPr>
+          <a:xfrm>
+            <a:off x="20120528" y="596900"/>
+            <a:ext cx="2416329" cy="766806"/>
+          </a:xfrm>
+          <a:prstGeom prst="rect">
+            <a:avLst/>
+          </a:prstGeom>
+          <a:ln w="12700">
+            <a:miter lim="400000"/>
+          </a:ln>
+        </p:spPr>
+      </p:pic>
+      <p:sp>
+        <p:nvSpPr>
+          <p:cNvPr id="197" name="Shape 197"/>
+          <p:cNvSpPr/>
+          <p:nvPr/>
+        </p:nvSpPr>
+        <p:spPr>
+          <a:xfrm>
+            <a:off x="1044066" y="500292"/>
+            <a:ext cx="10746532" cy="795089"/>
+          </a:xfrm>
+          <a:prstGeom prst="rect">
+            <a:avLst/>
+          </a:prstGeom>
+          <a:ln w="12700">
+            <a:miter lim="400000"/>
+          </a:ln>
+          <a:extLst>
+            <a:ext uri="{C572A759-6A51-4108-AA02-DFA0A04FC94B}">
+              <ma14:wrappingTextBoxFlag xmlns="" xmlns:ma14="http://schemas.microsoft.com/office/mac/drawingml/2011/main" val="1"/>
+            </a:ext>
+          </a:extLst>
+        </p:spPr>
+        <p:txBody>
+          <a:bodyPr wrap="none" lIns="50800" tIns="50800" rIns="50800" bIns="50800" anchor="ctr">
+            <a:spAutoFit/>
+          </a:bodyPr>
+          <a:lstStyle>
+            <a:lvl1pPr>
+              <a:defRPr sz="4500">
+                <a:solidFill>
+                  <a:srgbClr val="FFFFFF"/>
+                </a:solidFill>
+                <a:latin typeface="Helvetica Neue"/>
+                <a:ea typeface="Helvetica Neue"/>
+                <a:cs typeface="Helvetica Neue"/>
+                <a:sym typeface="Helvetica Neue"/>
+              </a:defRPr>
+            </a:lvl1pPr>
+          </a:lstStyle>
+          <a:p>
+            <a:r>
+              <a:rPr lang="es-ES" dirty="0"/>
+              <a:t>7. Mecanismos de seguimiento y control </a:t>
+            </a:r>
+            <a:endParaRPr dirty="0"/>
+          </a:p>
+        </p:txBody>
+      </p:sp>
+      <p:grpSp>
+        <p:nvGrpSpPr>
+          <p:cNvPr id="200" name="Group 200"/>
+          <p:cNvGrpSpPr/>
+          <p:nvPr/>
+        </p:nvGrpSpPr>
+        <p:grpSpPr>
+          <a:xfrm>
+            <a:off x="7414996" y="2325396"/>
+            <a:ext cx="12448356" cy="2664491"/>
+            <a:chOff x="-5559280" y="871459"/>
+            <a:chExt cx="19390950" cy="2664487"/>
+          </a:xfrm>
+        </p:grpSpPr>
+        <p:sp>
+          <p:nvSpPr>
+            <p:cNvPr id="198" name="Shape 198"/>
+            <p:cNvSpPr/>
+            <p:nvPr/>
+          </p:nvSpPr>
+          <p:spPr>
+            <a:xfrm>
+              <a:off x="-3570267" y="871459"/>
+              <a:ext cx="13823051" cy="771399"/>
+            </a:xfrm>
+            <a:prstGeom prst="roundRect">
+              <a:avLst>
+                <a:gd name="adj" fmla="val 33536"/>
+              </a:avLst>
+            </a:prstGeom>
+            <a:solidFill>
+              <a:srgbClr val="BA6B89"/>
+            </a:solidFill>
+            <a:ln w="12700" cap="flat">
+              <a:noFill/>
+              <a:miter lim="400000"/>
+            </a:ln>
+            <a:effectLst/>
+          </p:spPr>
+          <p:txBody>
+            <a:bodyPr wrap="square" lIns="50800" tIns="50800" rIns="50800" bIns="50800" numCol="1" anchor="ctr">
+              <a:noAutofit/>
+            </a:bodyPr>
+            <a:lstStyle/>
+            <a:p>
+              <a:pPr algn="ctr">
+                <a:lnSpc>
+                  <a:spcPct val="80000"/>
+                </a:lnSpc>
+                <a:spcBef>
+                  <a:spcPts val="0"/>
+                </a:spcBef>
+                <a:defRPr sz="4000" cap="all">
+                  <a:solidFill>
+                    <a:srgbClr val="FFFFFF"/>
+                  </a:solidFill>
+                  <a:latin typeface="+mn-lt"/>
+                  <a:ea typeface="+mn-ea"/>
+                  <a:cs typeface="+mn-cs"/>
+                  <a:sym typeface="DIN Condensed"/>
+                </a:defRPr>
+              </a:pPr>
+              <a:endParaRPr dirty="0"/>
+            </a:p>
+          </p:txBody>
+        </p:sp>
+        <p:sp>
+          <p:nvSpPr>
+            <p:cNvPr id="199" name="Shape 199"/>
+            <p:cNvSpPr/>
+            <p:nvPr/>
+          </p:nvSpPr>
+          <p:spPr>
+            <a:xfrm>
+              <a:off x="-2905026" y="975028"/>
+              <a:ext cx="15551661" cy="564256"/>
+            </a:xfrm>
+            <a:prstGeom prst="rect">
+              <a:avLst/>
+            </a:prstGeom>
+            <a:noFill/>
+            <a:ln w="12700" cap="flat">
+              <a:noFill/>
+              <a:miter lim="400000"/>
+            </a:ln>
+            <a:effectLst/>
+            <a:extLst>
+              <a:ext uri="{C572A759-6A51-4108-AA02-DFA0A04FC94B}">
+                <ma14:wrappingTextBoxFlag xmlns="" xmlns:ma14="http://schemas.microsoft.com/office/mac/drawingml/2011/main" val="1"/>
+              </a:ext>
+            </a:extLst>
+          </p:spPr>
+          <p:txBody>
+            <a:bodyPr wrap="square" lIns="50800" tIns="50800" rIns="50800" bIns="50800" numCol="1" anchor="ctr">
+              <a:spAutoFit/>
+            </a:bodyPr>
+            <a:lstStyle>
+              <a:lvl1pPr>
+                <a:defRPr>
+                  <a:solidFill>
+                    <a:srgbClr val="FFFFFF"/>
+                  </a:solidFill>
+                </a:defRPr>
+              </a:lvl1pPr>
+            </a:lstStyle>
+            <a:p>
+              <a:r>
+                <a:rPr lang="es-ES" dirty="0"/>
+                <a:t>2 Gestión y control de cambios (Plan GCS)</a:t>
+              </a:r>
+              <a:endParaRPr dirty="0"/>
+            </a:p>
+          </p:txBody>
+        </p:sp>
+        <p:sp>
+          <p:nvSpPr>
+            <p:cNvPr id="12" name="Shape 198"/>
+            <p:cNvSpPr/>
+            <p:nvPr/>
+          </p:nvSpPr>
+          <p:spPr>
+            <a:xfrm>
+              <a:off x="-5559280" y="2764547"/>
+              <a:ext cx="17758030" cy="771399"/>
+            </a:xfrm>
+            <a:prstGeom prst="roundRect">
+              <a:avLst>
+                <a:gd name="adj" fmla="val 33536"/>
+              </a:avLst>
+            </a:prstGeom>
+            <a:solidFill>
+              <a:srgbClr val="BA6B89"/>
+            </a:solidFill>
+            <a:ln w="12700" cap="flat">
+              <a:noFill/>
+              <a:miter lim="400000"/>
+            </a:ln>
+            <a:effectLst/>
+          </p:spPr>
+          <p:txBody>
+            <a:bodyPr wrap="square" lIns="50800" tIns="50800" rIns="50800" bIns="50800" numCol="1" anchor="ctr">
+              <a:noAutofit/>
+            </a:bodyPr>
+            <a:lstStyle/>
+            <a:p>
+              <a:pPr algn="ctr">
+                <a:lnSpc>
+                  <a:spcPct val="80000"/>
+                </a:lnSpc>
+                <a:spcBef>
+                  <a:spcPts val="0"/>
+                </a:spcBef>
+                <a:defRPr sz="4000" cap="all">
+                  <a:solidFill>
+                    <a:srgbClr val="FFFFFF"/>
+                  </a:solidFill>
+                  <a:latin typeface="+mn-lt"/>
+                  <a:ea typeface="+mn-ea"/>
+                  <a:cs typeface="+mn-cs"/>
+                  <a:sym typeface="DIN Condensed"/>
+                </a:defRPr>
+              </a:pPr>
+              <a:endParaRPr dirty="0"/>
+            </a:p>
+          </p:txBody>
+        </p:sp>
+        <p:sp>
+          <p:nvSpPr>
+            <p:cNvPr id="13" name="Shape 199"/>
+            <p:cNvSpPr/>
+            <p:nvPr/>
+          </p:nvSpPr>
+          <p:spPr>
+            <a:xfrm>
+              <a:off x="-4894039" y="2868116"/>
+              <a:ext cx="18725709" cy="564256"/>
+            </a:xfrm>
+            <a:prstGeom prst="rect">
+              <a:avLst/>
+            </a:prstGeom>
+            <a:noFill/>
+            <a:ln w="12700" cap="flat">
+              <a:noFill/>
+              <a:miter lim="400000"/>
+            </a:ln>
+            <a:effectLst/>
+            <a:extLst>
+              <a:ext uri="{C572A759-6A51-4108-AA02-DFA0A04FC94B}">
+                <ma14:wrappingTextBoxFlag xmlns="" xmlns:ma14="http://schemas.microsoft.com/office/mac/drawingml/2011/main" val="1"/>
+              </a:ext>
+            </a:extLst>
+          </p:spPr>
+          <p:txBody>
+            <a:bodyPr wrap="square" lIns="50800" tIns="50800" rIns="50800" bIns="50800" numCol="1" anchor="ctr">
+              <a:spAutoFit/>
+            </a:bodyPr>
+            <a:lstStyle>
+              <a:lvl1pPr>
+                <a:defRPr>
+                  <a:solidFill>
+                    <a:srgbClr val="FFFFFF"/>
+                  </a:solidFill>
+                </a:defRPr>
+              </a:lvl1pPr>
+            </a:lstStyle>
+            <a:p>
+              <a:r>
+                <a:rPr lang="es-ES" dirty="0"/>
+                <a:t>2.1 Introducción: Propósito, Alcance, Definiciones, Referencias</a:t>
+              </a:r>
+              <a:endParaRPr dirty="0"/>
+            </a:p>
+          </p:txBody>
+        </p:sp>
+      </p:grpSp>
+      <p:sp>
+        <p:nvSpPr>
+          <p:cNvPr id="16" name="Shape 212"/>
+          <p:cNvSpPr/>
+          <p:nvPr/>
+        </p:nvSpPr>
+        <p:spPr>
+          <a:xfrm>
+            <a:off x="4564490" y="3657639"/>
+            <a:ext cx="16604319" cy="9486861"/>
+          </a:xfrm>
+          <a:prstGeom prst="roundRect">
+            <a:avLst>
+              <a:gd name="adj" fmla="val 7944"/>
+            </a:avLst>
+          </a:prstGeom>
+          <a:ln w="50800">
+            <a:solidFill>
+              <a:srgbClr val="5B5854"/>
+            </a:solidFill>
+            <a:miter lim="400000"/>
+          </a:ln>
+        </p:spPr>
+        <p:txBody>
+          <a:bodyPr lIns="50800" tIns="50800" rIns="50800" bIns="50800" anchor="ctr"/>
+          <a:lstStyle/>
+          <a:p>
+            <a:pPr algn="ctr">
+              <a:lnSpc>
+                <a:spcPct val="80000"/>
+              </a:lnSpc>
+              <a:spcBef>
+                <a:spcPts val="0"/>
+              </a:spcBef>
+              <a:defRPr sz="100" cap="all">
+                <a:solidFill>
+                  <a:srgbClr val="FFFFFF"/>
+                </a:solidFill>
+                <a:latin typeface="+mn-lt"/>
+                <a:ea typeface="+mn-ea"/>
+                <a:cs typeface="+mn-cs"/>
+                <a:sym typeface="DIN Condensed"/>
+              </a:defRPr>
+            </a:pPr>
+            <a:endParaRPr/>
+          </a:p>
+        </p:txBody>
+      </p:sp>
+      <p:sp>
+        <p:nvSpPr>
+          <p:cNvPr id="3" name="Marcador de número de diapositiva 2"/>
+          <p:cNvSpPr>
+            <a:spLocks noGrp="1"/>
+          </p:cNvSpPr>
+          <p:nvPr>
+            <p:ph type="sldNum" sz="quarter" idx="2"/>
+          </p:nvPr>
+        </p:nvSpPr>
+        <p:spPr/>
+        <p:txBody>
+          <a:bodyPr/>
+          <a:lstStyle/>
+          <a:p>
+            <a:fld id="{86CB4B4D-7CA3-9044-876B-883B54F8677D}" type="slidenum">
+              <a:rPr lang="es-ES" smtClean="0"/>
+              <a:t>31</a:t>
+            </a:fld>
+            <a:endParaRPr lang="es-ES"/>
+          </a:p>
+        </p:txBody>
+      </p:sp>
+      <p:sp>
+        <p:nvSpPr>
+          <p:cNvPr id="4" name="Rectángulo 3"/>
+          <p:cNvSpPr/>
+          <p:nvPr/>
+        </p:nvSpPr>
+        <p:spPr>
+          <a:xfrm>
+            <a:off x="6115697" y="6931435"/>
+            <a:ext cx="4433048" cy="4478149"/>
+          </a:xfrm>
+          <a:prstGeom prst="rect">
+            <a:avLst/>
+          </a:prstGeom>
+        </p:spPr>
+        <p:txBody>
+          <a:bodyPr wrap="square">
+            <a:spAutoFit/>
+          </a:bodyPr>
+          <a:lstStyle/>
+          <a:p>
+            <a:r>
+              <a:rPr lang="es-ES" sz="2500" dirty="0">
+                <a:solidFill>
+                  <a:srgbClr val="00000A"/>
+                </a:solidFill>
+                <a:uFill>
+                  <a:solidFill>
+                    <a:srgbClr val="00000A"/>
+                  </a:solidFill>
+                </a:uFill>
+                <a:latin typeface="Helvetica Neue"/>
+                <a:ea typeface="Helvetica Neue"/>
+                <a:cs typeface="Helvetica Neue"/>
+              </a:rPr>
+              <a:t>Las tareas claves son:</a:t>
+            </a:r>
+          </a:p>
+          <a:p>
+            <a:pPr marL="342900" indent="-342900">
+              <a:buFont typeface="Arial" panose="020B0604020202020204" pitchFamily="34" charset="0"/>
+              <a:buChar char="•"/>
+            </a:pPr>
+            <a:r>
+              <a:rPr lang="es-ES" sz="2500" dirty="0">
+                <a:solidFill>
+                  <a:srgbClr val="00000A"/>
+                </a:solidFill>
+                <a:uFill>
+                  <a:solidFill>
+                    <a:srgbClr val="00000A"/>
+                  </a:solidFill>
+                </a:uFill>
+                <a:latin typeface="Helvetica Neue"/>
+                <a:ea typeface="Helvetica Neue"/>
+                <a:cs typeface="Helvetica Neue"/>
+              </a:rPr>
+              <a:t>Identificar y controlar el cambio</a:t>
+            </a:r>
+          </a:p>
+          <a:p>
+            <a:pPr marL="342900" indent="-342900">
+              <a:buFont typeface="Arial" panose="020B0604020202020204" pitchFamily="34" charset="0"/>
+              <a:buChar char="•"/>
+            </a:pPr>
+            <a:r>
+              <a:rPr lang="es-ES" sz="2500" dirty="0">
+                <a:solidFill>
+                  <a:srgbClr val="00000A"/>
+                </a:solidFill>
+                <a:uFill>
+                  <a:solidFill>
+                    <a:srgbClr val="00000A"/>
+                  </a:solidFill>
+                </a:uFill>
+                <a:latin typeface="Helvetica Neue"/>
+                <a:ea typeface="Helvetica Neue"/>
+                <a:cs typeface="Helvetica Neue"/>
+              </a:rPr>
+              <a:t>Garantizar la correcta implementación del cambio</a:t>
+            </a:r>
+          </a:p>
+          <a:p>
+            <a:pPr marL="342900" indent="-342900">
+              <a:buFont typeface="Arial" panose="020B0604020202020204" pitchFamily="34" charset="0"/>
+              <a:buChar char="•"/>
+            </a:pPr>
+            <a:r>
+              <a:rPr lang="es-ES" sz="2500" dirty="0">
+                <a:solidFill>
+                  <a:srgbClr val="00000A"/>
+                </a:solidFill>
+                <a:uFill>
+                  <a:solidFill>
+                    <a:srgbClr val="00000A"/>
+                  </a:solidFill>
+                </a:uFill>
+                <a:latin typeface="Helvetica Neue"/>
+                <a:ea typeface="Helvetica Neue"/>
+                <a:cs typeface="Helvetica Neue"/>
+              </a:rPr>
+              <a:t>Informar del cambio a todos aquellos que lo necesiten</a:t>
+            </a:r>
+          </a:p>
+        </p:txBody>
+      </p:sp>
+      <p:sp>
+        <p:nvSpPr>
+          <p:cNvPr id="7" name="Rectángulo 6"/>
+          <p:cNvSpPr/>
+          <p:nvPr/>
+        </p:nvSpPr>
+        <p:spPr>
+          <a:xfrm>
+            <a:off x="13957231" y="7453441"/>
+            <a:ext cx="4962525" cy="4580741"/>
+          </a:xfrm>
+          <a:prstGeom prst="rect">
+            <a:avLst/>
+          </a:prstGeom>
+        </p:spPr>
+        <p:txBody>
+          <a:bodyPr wrap="square">
+            <a:spAutoFit/>
+          </a:bodyPr>
+          <a:lstStyle/>
+          <a:p>
+            <a:r>
+              <a:rPr lang="es-ES" sz="2500" dirty="0">
+                <a:solidFill>
+                  <a:srgbClr val="00000A"/>
+                </a:solidFill>
+                <a:uFill>
+                  <a:solidFill>
+                    <a:srgbClr val="00000A"/>
+                  </a:solidFill>
+                </a:uFill>
+                <a:latin typeface="Helvetica Neue"/>
+                <a:ea typeface="Helvetica Neue"/>
+                <a:cs typeface="Helvetica Neue"/>
+              </a:rPr>
+              <a:t>Las actividades de la GCS son:</a:t>
+            </a:r>
+          </a:p>
+          <a:p>
+            <a:pPr marL="342900" indent="-342900">
+              <a:buFont typeface="Arial" panose="020B0604020202020204" pitchFamily="34" charset="0"/>
+              <a:buChar char="•"/>
+            </a:pPr>
+            <a:r>
+              <a:rPr lang="es-ES" sz="2500" dirty="0">
+                <a:solidFill>
+                  <a:srgbClr val="00000A"/>
+                </a:solidFill>
+                <a:uFill>
+                  <a:solidFill>
+                    <a:srgbClr val="00000A"/>
+                  </a:solidFill>
+                </a:uFill>
+                <a:latin typeface="Helvetica Neue"/>
+                <a:ea typeface="Helvetica Neue"/>
+                <a:cs typeface="Helvetica Neue"/>
+              </a:rPr>
+              <a:t>Identificar ECS</a:t>
+            </a:r>
+          </a:p>
+          <a:p>
+            <a:pPr marL="342900" indent="-342900">
+              <a:buFont typeface="Arial" panose="020B0604020202020204" pitchFamily="34" charset="0"/>
+              <a:buChar char="•"/>
+            </a:pPr>
+            <a:r>
+              <a:rPr lang="es-ES" sz="2500" dirty="0">
+                <a:solidFill>
+                  <a:srgbClr val="00000A"/>
+                </a:solidFill>
+                <a:uFill>
+                  <a:solidFill>
+                    <a:srgbClr val="00000A"/>
+                  </a:solidFill>
+                </a:uFill>
+                <a:latin typeface="Helvetica Neue"/>
+                <a:ea typeface="Helvetica Neue"/>
+                <a:cs typeface="Helvetica Neue"/>
+              </a:rPr>
+              <a:t>Control versiones</a:t>
+            </a:r>
+          </a:p>
+          <a:p>
+            <a:pPr marL="342900" indent="-342900">
+              <a:buFont typeface="Arial" panose="020B0604020202020204" pitchFamily="34" charset="0"/>
+              <a:buChar char="•"/>
+            </a:pPr>
+            <a:r>
+              <a:rPr lang="es-ES" sz="2500" dirty="0">
+                <a:solidFill>
+                  <a:srgbClr val="00000A"/>
+                </a:solidFill>
+                <a:uFill>
+                  <a:solidFill>
+                    <a:srgbClr val="00000A"/>
+                  </a:solidFill>
+                </a:uFill>
+                <a:latin typeface="Helvetica Neue"/>
+                <a:ea typeface="Helvetica Neue"/>
+                <a:cs typeface="Helvetica Neue"/>
+              </a:rPr>
+              <a:t>Gestión del cambio</a:t>
+            </a:r>
+          </a:p>
+          <a:p>
+            <a:pPr marL="342900" indent="-342900">
+              <a:buFont typeface="Arial" panose="020B0604020202020204" pitchFamily="34" charset="0"/>
+              <a:buChar char="•"/>
+            </a:pPr>
+            <a:r>
+              <a:rPr lang="es-ES" sz="2500" dirty="0">
+                <a:solidFill>
+                  <a:srgbClr val="00000A"/>
+                </a:solidFill>
+                <a:uFill>
+                  <a:solidFill>
+                    <a:srgbClr val="00000A"/>
+                  </a:solidFill>
+                </a:uFill>
+                <a:latin typeface="Helvetica Neue"/>
+                <a:ea typeface="Helvetica Neue"/>
+                <a:cs typeface="Helvetica Neue"/>
+              </a:rPr>
+              <a:t>Auditoria de configuración</a:t>
+            </a:r>
+          </a:p>
+          <a:p>
+            <a:pPr marL="342900" indent="-342900">
+              <a:buFont typeface="Arial" panose="020B0604020202020204" pitchFamily="34" charset="0"/>
+              <a:buChar char="•"/>
+            </a:pPr>
+            <a:r>
+              <a:rPr lang="es-ES" sz="2500" dirty="0">
+                <a:solidFill>
+                  <a:srgbClr val="00000A"/>
+                </a:solidFill>
+                <a:uFill>
+                  <a:solidFill>
+                    <a:srgbClr val="00000A"/>
+                  </a:solidFill>
+                </a:uFill>
+                <a:latin typeface="Helvetica Neue"/>
+                <a:ea typeface="Helvetica Neue"/>
+                <a:cs typeface="Helvetica Neue"/>
+              </a:rPr>
+              <a:t>Informes de estado</a:t>
+            </a:r>
+          </a:p>
+        </p:txBody>
+      </p:sp>
+      <p:sp>
+        <p:nvSpPr>
+          <p:cNvPr id="10" name="Rectángulo 9"/>
+          <p:cNvSpPr/>
+          <p:nvPr/>
+        </p:nvSpPr>
+        <p:spPr>
+          <a:xfrm>
+            <a:off x="6115698" y="5529774"/>
+            <a:ext cx="6006484" cy="861774"/>
+          </a:xfrm>
+          <a:prstGeom prst="rect">
+            <a:avLst/>
+          </a:prstGeom>
+        </p:spPr>
+        <p:txBody>
+          <a:bodyPr wrap="square">
+            <a:spAutoFit/>
+          </a:bodyPr>
+          <a:lstStyle/>
+          <a:p>
+            <a:r>
+              <a:rPr lang="es-ES" sz="2500" dirty="0">
+                <a:solidFill>
+                  <a:srgbClr val="00000A"/>
+                </a:solidFill>
+                <a:uFill>
+                  <a:solidFill>
+                    <a:srgbClr val="00000A"/>
+                  </a:solidFill>
+                </a:uFill>
+                <a:latin typeface="Helvetica Neue"/>
+                <a:ea typeface="Helvetica Neue"/>
+                <a:cs typeface="Helvetica Neue"/>
+              </a:rPr>
+              <a:t>Gestionamos el cambio en los artefactos a lo largo del ciclo de vida del producto.</a:t>
+            </a:r>
+          </a:p>
+        </p:txBody>
+      </p:sp>
+      <p:sp>
+        <p:nvSpPr>
+          <p:cNvPr id="14" name="Rectángulo 13"/>
+          <p:cNvSpPr/>
+          <p:nvPr/>
+        </p:nvSpPr>
+        <p:spPr>
+          <a:xfrm>
+            <a:off x="13957231" y="5406056"/>
+            <a:ext cx="5305942" cy="1631216"/>
+          </a:xfrm>
+          <a:prstGeom prst="rect">
+            <a:avLst/>
+          </a:prstGeom>
+        </p:spPr>
+        <p:txBody>
+          <a:bodyPr wrap="square">
+            <a:spAutoFit/>
+          </a:bodyPr>
+          <a:lstStyle/>
+          <a:p>
+            <a:r>
+              <a:rPr lang="es-ES" sz="2500" dirty="0">
+                <a:solidFill>
+                  <a:srgbClr val="00000A"/>
+                </a:solidFill>
+                <a:uFill>
+                  <a:solidFill>
+                    <a:srgbClr val="00000A"/>
+                  </a:solidFill>
+                </a:uFill>
+                <a:latin typeface="Helvetica Neue"/>
+                <a:ea typeface="Helvetica Neue"/>
+                <a:cs typeface="Helvetica Neue"/>
+              </a:rPr>
+              <a:t>Garantizamos que en todo momento se controla las copias, los cambios y versiones pasadas, actuales y futuras del proyecto</a:t>
+            </a:r>
+          </a:p>
+        </p:txBody>
+      </p:sp>
+      <p:sp>
+        <p:nvSpPr>
+          <p:cNvPr id="23" name="Shape 212"/>
+          <p:cNvSpPr/>
+          <p:nvPr/>
+        </p:nvSpPr>
+        <p:spPr>
+          <a:xfrm>
+            <a:off x="5732942" y="5277086"/>
+            <a:ext cx="6771996" cy="6905352"/>
+          </a:xfrm>
+          <a:prstGeom prst="roundRect">
+            <a:avLst>
+              <a:gd name="adj" fmla="val 7944"/>
+            </a:avLst>
+          </a:prstGeom>
+          <a:ln w="50800">
+            <a:solidFill>
+              <a:srgbClr val="5B5854"/>
+            </a:solidFill>
+            <a:miter lim="400000"/>
+          </a:ln>
+        </p:spPr>
+        <p:txBody>
+          <a:bodyPr lIns="50800" tIns="50800" rIns="50800" bIns="50800" anchor="ctr"/>
+          <a:lstStyle/>
+          <a:p>
+            <a:pPr algn="ctr">
+              <a:lnSpc>
+                <a:spcPct val="80000"/>
+              </a:lnSpc>
+              <a:spcBef>
+                <a:spcPts val="0"/>
+              </a:spcBef>
+              <a:defRPr sz="100" cap="all">
+                <a:solidFill>
+                  <a:srgbClr val="FFFFFF"/>
+                </a:solidFill>
+                <a:latin typeface="+mn-lt"/>
+                <a:ea typeface="+mn-ea"/>
+                <a:cs typeface="+mn-cs"/>
+                <a:sym typeface="DIN Condensed"/>
+              </a:defRPr>
+            </a:pPr>
+            <a:endParaRPr/>
+          </a:p>
+        </p:txBody>
+      </p:sp>
+      <p:sp>
+        <p:nvSpPr>
+          <p:cNvPr id="24" name="Shape 212"/>
+          <p:cNvSpPr/>
+          <p:nvPr/>
+        </p:nvSpPr>
+        <p:spPr>
+          <a:xfrm>
+            <a:off x="13450875" y="5277086"/>
+            <a:ext cx="6771996" cy="6905352"/>
+          </a:xfrm>
+          <a:prstGeom prst="roundRect">
+            <a:avLst>
+              <a:gd name="adj" fmla="val 7944"/>
+            </a:avLst>
+          </a:prstGeom>
+          <a:ln w="50800">
+            <a:solidFill>
+              <a:srgbClr val="5B5854"/>
+            </a:solidFill>
+            <a:miter lim="400000"/>
+          </a:ln>
+        </p:spPr>
+        <p:txBody>
+          <a:bodyPr lIns="50800" tIns="50800" rIns="50800" bIns="50800" anchor="ctr"/>
+          <a:lstStyle/>
+          <a:p>
+            <a:pPr algn="ctr">
+              <a:lnSpc>
+                <a:spcPct val="80000"/>
+              </a:lnSpc>
+              <a:spcBef>
+                <a:spcPts val="0"/>
+              </a:spcBef>
+              <a:defRPr sz="100" cap="all">
+                <a:solidFill>
+                  <a:srgbClr val="FFFFFF"/>
+                </a:solidFill>
+                <a:latin typeface="+mn-lt"/>
+                <a:ea typeface="+mn-ea"/>
+                <a:cs typeface="+mn-cs"/>
+                <a:sym typeface="DIN Condensed"/>
+              </a:defRPr>
+            </a:pPr>
+            <a:endParaRPr/>
+          </a:p>
+        </p:txBody>
+      </p:sp>
+    </p:spTree>
+    <p:extLst>
+      <p:ext uri="{BB962C8B-B14F-4D97-AF65-F5344CB8AC3E}">
+        <p14:creationId xmlns:p14="http://schemas.microsoft.com/office/powerpoint/2010/main" val="1755441334"/>
+      </p:ext>
+    </p:extLst>
+  </p:cSld>
+  <p:clrMapOvr>
+    <a:masterClrMapping/>
+  </p:clrMapOvr>
+  <p:transition spd="med"/>
+</p:sld>
+</file>
+
+<file path=ppt/slides/slide32.xml><?xml version="1.0" encoding="utf-8"?>
+<p:sld xmlns:a="http://schemas.openxmlformats.org/drawingml/2006/main" xmlns:r="http://schemas.openxmlformats.org/officeDocument/2006/relationships" xmlns:p="http://schemas.openxmlformats.org/presentationml/2006/main">
+  <p:cSld>
+    <p:spTree>
+      <p:nvGrpSpPr>
+        <p:cNvPr id="1" name=""/>
+        <p:cNvGrpSpPr/>
+        <p:nvPr/>
+      </p:nvGrpSpPr>
+      <p:grpSpPr>
+        <a:xfrm>
+          <a:off x="0" y="0"/>
+          <a:ext cx="0" cy="0"/>
+          <a:chOff x="0" y="0"/>
+          <a:chExt cx="0" cy="0"/>
+        </a:xfrm>
+      </p:grpSpPr>
+      <p:pic>
+        <p:nvPicPr>
+          <p:cNvPr id="194" name="pasted-image.tiff"/>
+          <p:cNvPicPr>
+            <a:picLocks noChangeAspect="1"/>
+          </p:cNvPicPr>
+          <p:nvPr/>
+        </p:nvPicPr>
+        <p:blipFill>
+          <a:blip r:embed="rId2">
+            <a:extLst/>
+          </a:blip>
+          <a:stretch>
+            <a:fillRect/>
+          </a:stretch>
+        </p:blipFill>
+        <p:spPr>
+          <a:xfrm>
+            <a:off x="-816206" y="-529723"/>
+            <a:ext cx="26829216" cy="2397845"/>
+          </a:xfrm>
+          <a:prstGeom prst="rect">
+            <a:avLst/>
+          </a:prstGeom>
+          <a:ln w="12700">
+            <a:miter lim="400000"/>
+          </a:ln>
+        </p:spPr>
+      </p:pic>
+      <p:pic>
+        <p:nvPicPr>
+          <p:cNvPr id="195" name="pasted-image.tiff"/>
+          <p:cNvPicPr>
+            <a:picLocks noChangeAspect="1"/>
+          </p:cNvPicPr>
+          <p:nvPr/>
+        </p:nvPicPr>
+        <p:blipFill>
+          <a:blip r:embed="rId3">
+            <a:extLst/>
+          </a:blip>
+          <a:stretch>
+            <a:fillRect/>
+          </a:stretch>
+        </p:blipFill>
+        <p:spPr>
+          <a:xfrm>
+            <a:off x="20120528" y="596900"/>
+            <a:ext cx="2416329" cy="766806"/>
+          </a:xfrm>
+          <a:prstGeom prst="rect">
+            <a:avLst/>
+          </a:prstGeom>
+          <a:ln w="12700">
+            <a:miter lim="400000"/>
+          </a:ln>
+        </p:spPr>
+      </p:pic>
+      <p:sp>
+        <p:nvSpPr>
+          <p:cNvPr id="197" name="Shape 197"/>
+          <p:cNvSpPr/>
+          <p:nvPr/>
+        </p:nvSpPr>
+        <p:spPr>
+          <a:xfrm>
+            <a:off x="1044066" y="500292"/>
+            <a:ext cx="10746532" cy="795089"/>
+          </a:xfrm>
+          <a:prstGeom prst="rect">
+            <a:avLst/>
+          </a:prstGeom>
+          <a:ln w="12700">
+            <a:miter lim="400000"/>
+          </a:ln>
+          <a:extLst>
+            <a:ext uri="{C572A759-6A51-4108-AA02-DFA0A04FC94B}">
+              <ma14:wrappingTextBoxFlag xmlns="" xmlns:ma14="http://schemas.microsoft.com/office/mac/drawingml/2011/main" val="1"/>
+            </a:ext>
+          </a:extLst>
+        </p:spPr>
+        <p:txBody>
+          <a:bodyPr wrap="none" lIns="50800" tIns="50800" rIns="50800" bIns="50800" anchor="ctr">
+            <a:spAutoFit/>
+          </a:bodyPr>
+          <a:lstStyle>
+            <a:lvl1pPr>
+              <a:defRPr sz="4500">
+                <a:solidFill>
+                  <a:srgbClr val="FFFFFF"/>
+                </a:solidFill>
+                <a:latin typeface="Helvetica Neue"/>
+                <a:ea typeface="Helvetica Neue"/>
+                <a:cs typeface="Helvetica Neue"/>
+                <a:sym typeface="Helvetica Neue"/>
+              </a:defRPr>
+            </a:lvl1pPr>
+          </a:lstStyle>
+          <a:p>
+            <a:r>
+              <a:rPr lang="es-ES" dirty="0"/>
+              <a:t>7. Mecanismos de seguimiento y control </a:t>
+            </a:r>
+            <a:endParaRPr dirty="0"/>
+          </a:p>
+        </p:txBody>
+      </p:sp>
+      <p:grpSp>
+        <p:nvGrpSpPr>
+          <p:cNvPr id="200" name="Group 200"/>
+          <p:cNvGrpSpPr/>
+          <p:nvPr/>
+        </p:nvGrpSpPr>
+        <p:grpSpPr>
+          <a:xfrm>
+            <a:off x="8068493" y="2428965"/>
+            <a:ext cx="12448357" cy="1950957"/>
+            <a:chOff x="-4541320" y="975028"/>
+            <a:chExt cx="19390952" cy="1950954"/>
+          </a:xfrm>
+        </p:grpSpPr>
+        <p:sp>
+          <p:nvSpPr>
+            <p:cNvPr id="199" name="Shape 199"/>
+            <p:cNvSpPr/>
+            <p:nvPr/>
+          </p:nvSpPr>
+          <p:spPr>
+            <a:xfrm>
+              <a:off x="-2905026" y="975028"/>
+              <a:ext cx="15551661" cy="564256"/>
+            </a:xfrm>
+            <a:prstGeom prst="rect">
+              <a:avLst/>
+            </a:prstGeom>
+            <a:noFill/>
+            <a:ln w="12700" cap="flat">
+              <a:noFill/>
+              <a:miter lim="400000"/>
+            </a:ln>
+            <a:effectLst/>
+            <a:extLst>
+              <a:ext uri="{C572A759-6A51-4108-AA02-DFA0A04FC94B}">
+                <ma14:wrappingTextBoxFlag xmlns="" xmlns:ma14="http://schemas.microsoft.com/office/mac/drawingml/2011/main" val="1"/>
+              </a:ext>
+            </a:extLst>
+          </p:spPr>
+          <p:txBody>
+            <a:bodyPr wrap="square" lIns="50800" tIns="50800" rIns="50800" bIns="50800" numCol="1" anchor="ctr">
+              <a:spAutoFit/>
+            </a:bodyPr>
+            <a:lstStyle>
+              <a:lvl1pPr>
+                <a:defRPr>
+                  <a:solidFill>
+                    <a:srgbClr val="FFFFFF"/>
+                  </a:solidFill>
+                </a:defRPr>
+              </a:lvl1pPr>
+            </a:lstStyle>
+            <a:p>
+              <a:r>
+                <a:rPr lang="es-ES" dirty="0"/>
+                <a:t>2 Gestión y control de cambios (Plan GCS)</a:t>
+              </a:r>
+              <a:endParaRPr dirty="0"/>
+            </a:p>
+          </p:txBody>
+        </p:sp>
+        <p:sp>
+          <p:nvSpPr>
+            <p:cNvPr id="12" name="Shape 198"/>
+            <p:cNvSpPr/>
+            <p:nvPr/>
+          </p:nvSpPr>
+          <p:spPr>
+            <a:xfrm>
+              <a:off x="-4541320" y="2154583"/>
+              <a:ext cx="13823051" cy="771399"/>
+            </a:xfrm>
+            <a:prstGeom prst="roundRect">
+              <a:avLst>
+                <a:gd name="adj" fmla="val 33536"/>
+              </a:avLst>
+            </a:prstGeom>
+            <a:solidFill>
+              <a:srgbClr val="BA6B89"/>
+            </a:solidFill>
+            <a:ln w="12700" cap="flat">
+              <a:noFill/>
+              <a:miter lim="400000"/>
+            </a:ln>
+            <a:effectLst/>
+          </p:spPr>
+          <p:txBody>
+            <a:bodyPr wrap="square" lIns="50800" tIns="50800" rIns="50800" bIns="50800" numCol="1" anchor="ctr">
+              <a:noAutofit/>
+            </a:bodyPr>
+            <a:lstStyle/>
+            <a:p>
+              <a:pPr algn="ctr">
+                <a:lnSpc>
+                  <a:spcPct val="80000"/>
+                </a:lnSpc>
+                <a:spcBef>
+                  <a:spcPts val="0"/>
+                </a:spcBef>
+                <a:defRPr sz="4000" cap="all">
+                  <a:solidFill>
+                    <a:srgbClr val="FFFFFF"/>
+                  </a:solidFill>
+                  <a:latin typeface="+mn-lt"/>
+                  <a:ea typeface="+mn-ea"/>
+                  <a:cs typeface="+mn-cs"/>
+                  <a:sym typeface="DIN Condensed"/>
+                </a:defRPr>
+              </a:pPr>
+              <a:endParaRPr dirty="0"/>
+            </a:p>
+          </p:txBody>
+        </p:sp>
+        <p:sp>
+          <p:nvSpPr>
+            <p:cNvPr id="13" name="Shape 199"/>
+            <p:cNvSpPr/>
+            <p:nvPr/>
+          </p:nvSpPr>
+          <p:spPr>
+            <a:xfrm>
+              <a:off x="-3876077" y="2287169"/>
+              <a:ext cx="18725709" cy="564256"/>
+            </a:xfrm>
+            <a:prstGeom prst="rect">
+              <a:avLst/>
+            </a:prstGeom>
+            <a:noFill/>
+            <a:ln w="12700" cap="flat">
+              <a:noFill/>
+              <a:miter lim="400000"/>
+            </a:ln>
+            <a:effectLst/>
+            <a:extLst>
+              <a:ext uri="{C572A759-6A51-4108-AA02-DFA0A04FC94B}">
+                <ma14:wrappingTextBoxFlag xmlns="" xmlns:ma14="http://schemas.microsoft.com/office/mac/drawingml/2011/main" val="1"/>
+              </a:ext>
+            </a:extLst>
+          </p:spPr>
+          <p:txBody>
+            <a:bodyPr wrap="square" lIns="50800" tIns="50800" rIns="50800" bIns="50800" numCol="1" anchor="ctr">
+              <a:spAutoFit/>
+            </a:bodyPr>
+            <a:lstStyle>
+              <a:lvl1pPr>
+                <a:defRPr>
+                  <a:solidFill>
+                    <a:srgbClr val="FFFFFF"/>
+                  </a:solidFill>
+                </a:defRPr>
+              </a:lvl1pPr>
+            </a:lstStyle>
+            <a:p>
+              <a:r>
+                <a:rPr lang="es-ES" dirty="0"/>
+                <a:t>2.2 Tipos de artefactos a gestionar (los ECSs)</a:t>
+              </a:r>
+              <a:endParaRPr dirty="0"/>
+            </a:p>
+          </p:txBody>
+        </p:sp>
+      </p:grpSp>
+      <p:sp>
+        <p:nvSpPr>
+          <p:cNvPr id="16" name="Shape 212"/>
+          <p:cNvSpPr/>
+          <p:nvPr/>
+        </p:nvSpPr>
+        <p:spPr>
+          <a:xfrm>
+            <a:off x="4057650" y="2898137"/>
+            <a:ext cx="16459200" cy="10246363"/>
+          </a:xfrm>
+          <a:prstGeom prst="roundRect">
+            <a:avLst>
+              <a:gd name="adj" fmla="val 7944"/>
+            </a:avLst>
+          </a:prstGeom>
+          <a:ln w="50800">
+            <a:solidFill>
+              <a:srgbClr val="5B5854"/>
+            </a:solidFill>
+            <a:miter lim="400000"/>
+          </a:ln>
+        </p:spPr>
+        <p:txBody>
+          <a:bodyPr lIns="50800" tIns="50800" rIns="50800" bIns="50800" anchor="ctr"/>
+          <a:lstStyle/>
+          <a:p>
+            <a:pPr algn="ctr">
+              <a:lnSpc>
+                <a:spcPct val="80000"/>
+              </a:lnSpc>
+              <a:spcBef>
+                <a:spcPts val="0"/>
+              </a:spcBef>
+              <a:defRPr sz="100" cap="all">
+                <a:solidFill>
+                  <a:srgbClr val="FFFFFF"/>
+                </a:solidFill>
+                <a:latin typeface="+mn-lt"/>
+                <a:ea typeface="+mn-ea"/>
+                <a:cs typeface="+mn-cs"/>
+                <a:sym typeface="DIN Condensed"/>
+              </a:defRPr>
+            </a:pPr>
+            <a:endParaRPr/>
+          </a:p>
+        </p:txBody>
+      </p:sp>
+      <p:sp>
+        <p:nvSpPr>
+          <p:cNvPr id="3" name="Marcador de número de diapositiva 2"/>
+          <p:cNvSpPr>
+            <a:spLocks noGrp="1"/>
+          </p:cNvSpPr>
+          <p:nvPr>
+            <p:ph type="sldNum" sz="quarter" idx="2"/>
+          </p:nvPr>
+        </p:nvSpPr>
+        <p:spPr/>
+        <p:txBody>
+          <a:bodyPr/>
+          <a:lstStyle/>
+          <a:p>
+            <a:fld id="{86CB4B4D-7CA3-9044-876B-883B54F8677D}" type="slidenum">
+              <a:rPr lang="es-ES" smtClean="0"/>
+              <a:t>32</a:t>
+            </a:fld>
+            <a:endParaRPr lang="es-ES"/>
+          </a:p>
+        </p:txBody>
+      </p:sp>
+      <p:sp>
+        <p:nvSpPr>
+          <p:cNvPr id="4" name="Rectángulo 3"/>
+          <p:cNvSpPr/>
+          <p:nvPr/>
+        </p:nvSpPr>
+        <p:spPr>
+          <a:xfrm>
+            <a:off x="7520301" y="5422212"/>
+            <a:ext cx="10226335" cy="5401479"/>
+          </a:xfrm>
+          <a:prstGeom prst="rect">
+            <a:avLst/>
+          </a:prstGeom>
+        </p:spPr>
+        <p:txBody>
+          <a:bodyPr wrap="square">
+            <a:spAutoFit/>
+          </a:bodyPr>
+          <a:lstStyle/>
+          <a:p>
+            <a:r>
+              <a:rPr lang="es-ES" sz="2500" dirty="0">
+                <a:solidFill>
+                  <a:srgbClr val="00000A"/>
+                </a:solidFill>
+                <a:uFill>
+                  <a:solidFill>
+                    <a:srgbClr val="00000A"/>
+                  </a:solidFill>
+                </a:uFill>
+                <a:latin typeface="Helvetica Neue"/>
+                <a:ea typeface="Helvetica Neue"/>
+                <a:cs typeface="Helvetica Neue"/>
+              </a:rPr>
+              <a:t>•	La SRS o documento de Especificación de Requisitos Software</a:t>
+            </a:r>
+          </a:p>
+          <a:p>
+            <a:r>
+              <a:rPr lang="es-ES" sz="2500" dirty="0">
+                <a:solidFill>
+                  <a:srgbClr val="00000A"/>
+                </a:solidFill>
+                <a:uFill>
+                  <a:solidFill>
+                    <a:srgbClr val="00000A"/>
+                  </a:solidFill>
+                </a:uFill>
+                <a:latin typeface="Helvetica Neue"/>
+                <a:ea typeface="Helvetica Neue"/>
+                <a:cs typeface="Helvetica Neue"/>
+              </a:rPr>
+              <a:t>•	El plan del proyecto</a:t>
+            </a:r>
+          </a:p>
+          <a:p>
+            <a:r>
+              <a:rPr lang="es-ES" sz="2500" dirty="0">
+                <a:solidFill>
+                  <a:srgbClr val="00000A"/>
+                </a:solidFill>
+                <a:uFill>
+                  <a:solidFill>
+                    <a:srgbClr val="00000A"/>
+                  </a:solidFill>
+                </a:uFill>
+                <a:latin typeface="Helvetica Neue"/>
+                <a:ea typeface="Helvetica Neue"/>
+                <a:cs typeface="Helvetica Neue"/>
+              </a:rPr>
+              <a:t>•	El diseño</a:t>
+            </a:r>
+          </a:p>
+          <a:p>
+            <a:r>
+              <a:rPr lang="es-ES" sz="2500" dirty="0">
+                <a:solidFill>
+                  <a:srgbClr val="00000A"/>
+                </a:solidFill>
+                <a:uFill>
+                  <a:solidFill>
+                    <a:srgbClr val="00000A"/>
+                  </a:solidFill>
+                </a:uFill>
+                <a:latin typeface="Helvetica Neue"/>
+                <a:ea typeface="Helvetica Neue"/>
+                <a:cs typeface="Helvetica Neue"/>
+              </a:rPr>
+              <a:t>•	El código</a:t>
+            </a:r>
+          </a:p>
+          <a:p>
+            <a:r>
+              <a:rPr lang="es-ES" sz="2500" dirty="0">
+                <a:solidFill>
+                  <a:srgbClr val="00000A"/>
+                </a:solidFill>
+                <a:uFill>
+                  <a:solidFill>
+                    <a:srgbClr val="00000A"/>
+                  </a:solidFill>
+                </a:uFill>
+                <a:latin typeface="Helvetica Neue"/>
+                <a:ea typeface="Helvetica Neue"/>
+                <a:cs typeface="Helvetica Neue"/>
+              </a:rPr>
+              <a:t>•	Los casos de prueba</a:t>
+            </a:r>
+          </a:p>
+          <a:p>
+            <a:r>
+              <a:rPr lang="es-ES" sz="2500" dirty="0">
+                <a:solidFill>
+                  <a:srgbClr val="00000A"/>
+                </a:solidFill>
+                <a:uFill>
+                  <a:solidFill>
+                    <a:srgbClr val="00000A"/>
+                  </a:solidFill>
+                </a:uFill>
+                <a:latin typeface="Helvetica Neue"/>
+                <a:ea typeface="Helvetica Neue"/>
+                <a:cs typeface="Helvetica Neue"/>
+              </a:rPr>
+              <a:t>•	Estándares y procedimientos de la Ingeniería del Software</a:t>
+            </a:r>
+          </a:p>
+          <a:p>
+            <a:r>
+              <a:rPr lang="es-ES" sz="2500" dirty="0">
+                <a:solidFill>
+                  <a:srgbClr val="00000A"/>
+                </a:solidFill>
+                <a:uFill>
+                  <a:solidFill>
+                    <a:srgbClr val="00000A"/>
+                  </a:solidFill>
+                </a:uFill>
+                <a:latin typeface="Helvetica Neue"/>
+                <a:ea typeface="Helvetica Neue"/>
+                <a:cs typeface="Helvetica Neue"/>
+              </a:rPr>
+              <a:t>•	El editor y el compilador</a:t>
+            </a:r>
+          </a:p>
+        </p:txBody>
+      </p:sp>
+    </p:spTree>
+    <p:extLst>
+      <p:ext uri="{BB962C8B-B14F-4D97-AF65-F5344CB8AC3E}">
+        <p14:creationId xmlns:p14="http://schemas.microsoft.com/office/powerpoint/2010/main" val="2255549739"/>
+      </p:ext>
+    </p:extLst>
+  </p:cSld>
+  <p:clrMapOvr>
+    <a:masterClrMapping/>
+  </p:clrMapOvr>
+  <p:transition spd="med"/>
+</p:sld>
+</file>
+
+<file path=ppt/slides/slide33.xml><?xml version="1.0" encoding="utf-8"?>
+<p:sld xmlns:a="http://schemas.openxmlformats.org/drawingml/2006/main" xmlns:r="http://schemas.openxmlformats.org/officeDocument/2006/relationships" xmlns:p="http://schemas.openxmlformats.org/presentationml/2006/main">
+  <p:cSld>
+    <p:spTree>
+      <p:nvGrpSpPr>
+        <p:cNvPr id="1" name=""/>
+        <p:cNvGrpSpPr/>
+        <p:nvPr/>
+      </p:nvGrpSpPr>
+      <p:grpSpPr>
+        <a:xfrm>
+          <a:off x="0" y="0"/>
+          <a:ext cx="0" cy="0"/>
+          <a:chOff x="0" y="0"/>
+          <a:chExt cx="0" cy="0"/>
+        </a:xfrm>
+      </p:grpSpPr>
+      <p:pic>
+        <p:nvPicPr>
+          <p:cNvPr id="194" name="pasted-image.tiff"/>
+          <p:cNvPicPr>
+            <a:picLocks noChangeAspect="1"/>
+          </p:cNvPicPr>
+          <p:nvPr/>
+        </p:nvPicPr>
+        <p:blipFill>
+          <a:blip r:embed="rId2">
+            <a:extLst/>
+          </a:blip>
+          <a:stretch>
+            <a:fillRect/>
+          </a:stretch>
+        </p:blipFill>
+        <p:spPr>
+          <a:xfrm>
+            <a:off x="-816206" y="-529723"/>
+            <a:ext cx="26829216" cy="2397845"/>
+          </a:xfrm>
+          <a:prstGeom prst="rect">
+            <a:avLst/>
+          </a:prstGeom>
+          <a:ln w="12700">
+            <a:miter lim="400000"/>
+          </a:ln>
+        </p:spPr>
+      </p:pic>
+      <p:pic>
+        <p:nvPicPr>
+          <p:cNvPr id="195" name="pasted-image.tiff"/>
+          <p:cNvPicPr>
+            <a:picLocks noChangeAspect="1"/>
+          </p:cNvPicPr>
+          <p:nvPr/>
+        </p:nvPicPr>
+        <p:blipFill>
+          <a:blip r:embed="rId3">
+            <a:extLst/>
+          </a:blip>
+          <a:stretch>
+            <a:fillRect/>
+          </a:stretch>
+        </p:blipFill>
+        <p:spPr>
+          <a:xfrm>
+            <a:off x="20120528" y="596900"/>
+            <a:ext cx="2416329" cy="766806"/>
+          </a:xfrm>
+          <a:prstGeom prst="rect">
+            <a:avLst/>
+          </a:prstGeom>
+          <a:ln w="12700">
+            <a:miter lim="400000"/>
+          </a:ln>
+        </p:spPr>
+      </p:pic>
+      <p:sp>
+        <p:nvSpPr>
+          <p:cNvPr id="197" name="Shape 197"/>
+          <p:cNvSpPr/>
+          <p:nvPr/>
+        </p:nvSpPr>
+        <p:spPr>
+          <a:xfrm>
+            <a:off x="1044066" y="500292"/>
+            <a:ext cx="10746532" cy="795089"/>
+          </a:xfrm>
+          <a:prstGeom prst="rect">
+            <a:avLst/>
+          </a:prstGeom>
+          <a:ln w="12700">
+            <a:miter lim="400000"/>
+          </a:ln>
+          <a:extLst>
+            <a:ext uri="{C572A759-6A51-4108-AA02-DFA0A04FC94B}">
+              <ma14:wrappingTextBoxFlag xmlns="" xmlns:ma14="http://schemas.microsoft.com/office/mac/drawingml/2011/main" val="1"/>
+            </a:ext>
+          </a:extLst>
+        </p:spPr>
+        <p:txBody>
+          <a:bodyPr wrap="none" lIns="50800" tIns="50800" rIns="50800" bIns="50800" anchor="ctr">
+            <a:spAutoFit/>
+          </a:bodyPr>
+          <a:lstStyle>
+            <a:lvl1pPr>
+              <a:defRPr sz="4500">
+                <a:solidFill>
+                  <a:srgbClr val="FFFFFF"/>
+                </a:solidFill>
+                <a:latin typeface="Helvetica Neue"/>
+                <a:ea typeface="Helvetica Neue"/>
+                <a:cs typeface="Helvetica Neue"/>
+                <a:sym typeface="Helvetica Neue"/>
+              </a:defRPr>
+            </a:lvl1pPr>
+          </a:lstStyle>
+          <a:p>
+            <a:r>
+              <a:rPr lang="es-ES" dirty="0"/>
+              <a:t>7. Mecanismos de seguimiento y control </a:t>
+            </a:r>
+            <a:endParaRPr dirty="0"/>
+          </a:p>
+        </p:txBody>
+      </p:sp>
+      <p:grpSp>
+        <p:nvGrpSpPr>
+          <p:cNvPr id="200" name="Group 200"/>
+          <p:cNvGrpSpPr/>
+          <p:nvPr/>
+        </p:nvGrpSpPr>
+        <p:grpSpPr>
+          <a:xfrm>
+            <a:off x="8691876" y="2325396"/>
+            <a:ext cx="12448357" cy="2664491"/>
+            <a:chOff x="-3570269" y="871459"/>
+            <a:chExt cx="19390952" cy="2664487"/>
+          </a:xfrm>
+        </p:grpSpPr>
+        <p:sp>
+          <p:nvSpPr>
+            <p:cNvPr id="198" name="Shape 198"/>
+            <p:cNvSpPr/>
+            <p:nvPr/>
+          </p:nvSpPr>
+          <p:spPr>
+            <a:xfrm>
+              <a:off x="-3570267" y="871459"/>
+              <a:ext cx="13823051" cy="771399"/>
+            </a:xfrm>
+            <a:prstGeom prst="roundRect">
+              <a:avLst>
+                <a:gd name="adj" fmla="val 33536"/>
+              </a:avLst>
+            </a:prstGeom>
+            <a:solidFill>
+              <a:srgbClr val="BA6B89"/>
+            </a:solidFill>
+            <a:ln w="12700" cap="flat">
+              <a:noFill/>
+              <a:miter lim="400000"/>
+            </a:ln>
+            <a:effectLst/>
+          </p:spPr>
+          <p:txBody>
+            <a:bodyPr wrap="square" lIns="50800" tIns="50800" rIns="50800" bIns="50800" numCol="1" anchor="ctr">
+              <a:noAutofit/>
+            </a:bodyPr>
+            <a:lstStyle/>
+            <a:p>
+              <a:pPr algn="ctr">
+                <a:lnSpc>
+                  <a:spcPct val="80000"/>
+                </a:lnSpc>
+                <a:spcBef>
+                  <a:spcPts val="0"/>
+                </a:spcBef>
+                <a:defRPr sz="4000" cap="all">
+                  <a:solidFill>
+                    <a:srgbClr val="FFFFFF"/>
+                  </a:solidFill>
+                  <a:latin typeface="+mn-lt"/>
+                  <a:ea typeface="+mn-ea"/>
+                  <a:cs typeface="+mn-cs"/>
+                  <a:sym typeface="DIN Condensed"/>
+                </a:defRPr>
+              </a:pPr>
+              <a:endParaRPr dirty="0"/>
+            </a:p>
+          </p:txBody>
+        </p:sp>
+        <p:sp>
+          <p:nvSpPr>
+            <p:cNvPr id="199" name="Shape 199"/>
+            <p:cNvSpPr/>
+            <p:nvPr/>
+          </p:nvSpPr>
+          <p:spPr>
+            <a:xfrm>
+              <a:off x="-2905026" y="975028"/>
+              <a:ext cx="15551661" cy="564256"/>
+            </a:xfrm>
+            <a:prstGeom prst="rect">
+              <a:avLst/>
+            </a:prstGeom>
+            <a:noFill/>
+            <a:ln w="12700" cap="flat">
+              <a:noFill/>
+              <a:miter lim="400000"/>
+            </a:ln>
+            <a:effectLst/>
+            <a:extLst>
+              <a:ext uri="{C572A759-6A51-4108-AA02-DFA0A04FC94B}">
+                <ma14:wrappingTextBoxFlag xmlns="" xmlns:ma14="http://schemas.microsoft.com/office/mac/drawingml/2011/main" val="1"/>
+              </a:ext>
+            </a:extLst>
+          </p:spPr>
+          <p:txBody>
+            <a:bodyPr wrap="square" lIns="50800" tIns="50800" rIns="50800" bIns="50800" numCol="1" anchor="ctr">
+              <a:spAutoFit/>
+            </a:bodyPr>
+            <a:lstStyle>
+              <a:lvl1pPr>
+                <a:defRPr>
+                  <a:solidFill>
+                    <a:srgbClr val="FFFFFF"/>
+                  </a:solidFill>
+                </a:defRPr>
+              </a:lvl1pPr>
+            </a:lstStyle>
+            <a:p>
+              <a:r>
+                <a:rPr lang="es-ES" dirty="0"/>
+                <a:t>2 Gestión y control de cambios (Plan GCS)</a:t>
+              </a:r>
+              <a:endParaRPr dirty="0"/>
+            </a:p>
+          </p:txBody>
+        </p:sp>
+        <p:sp>
+          <p:nvSpPr>
+            <p:cNvPr id="12" name="Shape 198"/>
+            <p:cNvSpPr/>
+            <p:nvPr/>
+          </p:nvSpPr>
+          <p:spPr>
+            <a:xfrm>
+              <a:off x="-3570269" y="2764547"/>
+              <a:ext cx="13823052" cy="771399"/>
+            </a:xfrm>
+            <a:prstGeom prst="roundRect">
+              <a:avLst>
+                <a:gd name="adj" fmla="val 33536"/>
+              </a:avLst>
+            </a:prstGeom>
+            <a:solidFill>
+              <a:srgbClr val="BA6B89"/>
+            </a:solidFill>
+            <a:ln w="12700" cap="flat">
+              <a:noFill/>
+              <a:miter lim="400000"/>
+            </a:ln>
+            <a:effectLst/>
+          </p:spPr>
+          <p:txBody>
+            <a:bodyPr wrap="square" lIns="50800" tIns="50800" rIns="50800" bIns="50800" numCol="1" anchor="ctr">
+              <a:noAutofit/>
+            </a:bodyPr>
+            <a:lstStyle/>
+            <a:p>
+              <a:pPr algn="ctr">
+                <a:lnSpc>
+                  <a:spcPct val="80000"/>
+                </a:lnSpc>
+                <a:spcBef>
+                  <a:spcPts val="0"/>
+                </a:spcBef>
+                <a:defRPr sz="4000" cap="all">
+                  <a:solidFill>
+                    <a:srgbClr val="FFFFFF"/>
+                  </a:solidFill>
+                  <a:latin typeface="+mn-lt"/>
+                  <a:ea typeface="+mn-ea"/>
+                  <a:cs typeface="+mn-cs"/>
+                  <a:sym typeface="DIN Condensed"/>
+                </a:defRPr>
+              </a:pPr>
+              <a:endParaRPr dirty="0"/>
+            </a:p>
+          </p:txBody>
+        </p:sp>
+        <p:sp>
+          <p:nvSpPr>
+            <p:cNvPr id="13" name="Shape 199"/>
+            <p:cNvSpPr/>
+            <p:nvPr/>
+          </p:nvSpPr>
+          <p:spPr>
+            <a:xfrm>
+              <a:off x="-2905026" y="2897133"/>
+              <a:ext cx="18725709" cy="564256"/>
+            </a:xfrm>
+            <a:prstGeom prst="rect">
+              <a:avLst/>
+            </a:prstGeom>
+            <a:noFill/>
+            <a:ln w="12700" cap="flat">
+              <a:noFill/>
+              <a:miter lim="400000"/>
+            </a:ln>
+            <a:effectLst/>
+            <a:extLst>
+              <a:ext uri="{C572A759-6A51-4108-AA02-DFA0A04FC94B}">
+                <ma14:wrappingTextBoxFlag xmlns="" xmlns:ma14="http://schemas.microsoft.com/office/mac/drawingml/2011/main" val="1"/>
+              </a:ext>
+            </a:extLst>
+          </p:spPr>
+          <p:txBody>
+            <a:bodyPr wrap="square" lIns="50800" tIns="50800" rIns="50800" bIns="50800" numCol="1" anchor="ctr">
+              <a:spAutoFit/>
+            </a:bodyPr>
+            <a:lstStyle>
+              <a:lvl1pPr>
+                <a:defRPr>
+                  <a:solidFill>
+                    <a:srgbClr val="FFFFFF"/>
+                  </a:solidFill>
+                </a:defRPr>
+              </a:lvl1pPr>
+            </a:lstStyle>
+            <a:p>
+              <a:r>
+                <a:rPr lang="es-ES" dirty="0"/>
+                <a:t>2.2 Tipos de artefactos a gestionar (los ECSs)</a:t>
+              </a:r>
+              <a:endParaRPr dirty="0"/>
+            </a:p>
+          </p:txBody>
+        </p:sp>
+      </p:grpSp>
+      <p:sp>
+        <p:nvSpPr>
+          <p:cNvPr id="16" name="Shape 212"/>
+          <p:cNvSpPr/>
+          <p:nvPr/>
+        </p:nvSpPr>
+        <p:spPr>
+          <a:xfrm>
+            <a:off x="6057901" y="3657639"/>
+            <a:ext cx="14062628" cy="9486861"/>
+          </a:xfrm>
+          <a:prstGeom prst="roundRect">
+            <a:avLst>
+              <a:gd name="adj" fmla="val 7944"/>
+            </a:avLst>
+          </a:prstGeom>
+          <a:ln w="50800">
+            <a:solidFill>
+              <a:srgbClr val="5B5854"/>
+            </a:solidFill>
+            <a:miter lim="400000"/>
+          </a:ln>
+        </p:spPr>
+        <p:txBody>
+          <a:bodyPr lIns="50800" tIns="50800" rIns="50800" bIns="50800" anchor="ctr"/>
+          <a:lstStyle/>
+          <a:p>
+            <a:pPr algn="ctr">
+              <a:lnSpc>
+                <a:spcPct val="80000"/>
+              </a:lnSpc>
+              <a:spcBef>
+                <a:spcPts val="0"/>
+              </a:spcBef>
+              <a:defRPr sz="100" cap="all">
+                <a:solidFill>
+                  <a:srgbClr val="FFFFFF"/>
+                </a:solidFill>
+                <a:latin typeface="+mn-lt"/>
+                <a:ea typeface="+mn-ea"/>
+                <a:cs typeface="+mn-cs"/>
+                <a:sym typeface="DIN Condensed"/>
+              </a:defRPr>
+            </a:pPr>
+            <a:endParaRPr/>
+          </a:p>
+        </p:txBody>
+      </p:sp>
+      <p:sp>
+        <p:nvSpPr>
+          <p:cNvPr id="3" name="Marcador de número de diapositiva 2"/>
+          <p:cNvSpPr>
+            <a:spLocks noGrp="1"/>
+          </p:cNvSpPr>
+          <p:nvPr>
+            <p:ph type="sldNum" sz="quarter" idx="2"/>
+          </p:nvPr>
+        </p:nvSpPr>
+        <p:spPr/>
+        <p:txBody>
+          <a:bodyPr/>
+          <a:lstStyle/>
+          <a:p>
+            <a:fld id="{86CB4B4D-7CA3-9044-876B-883B54F8677D}" type="slidenum">
+              <a:rPr lang="es-ES" smtClean="0"/>
+              <a:t>33</a:t>
+            </a:fld>
+            <a:endParaRPr lang="es-ES"/>
+          </a:p>
+        </p:txBody>
+      </p:sp>
+      <p:sp>
+        <p:nvSpPr>
+          <p:cNvPr id="4" name="Rectángulo 3"/>
+          <p:cNvSpPr/>
+          <p:nvPr/>
+        </p:nvSpPr>
+        <p:spPr>
+          <a:xfrm>
+            <a:off x="8691876" y="6076248"/>
+            <a:ext cx="10226335" cy="5401479"/>
+          </a:xfrm>
+          <a:prstGeom prst="rect">
+            <a:avLst/>
+          </a:prstGeom>
+        </p:spPr>
+        <p:txBody>
+          <a:bodyPr wrap="square">
+            <a:spAutoFit/>
+          </a:bodyPr>
+          <a:lstStyle/>
+          <a:p>
+            <a:r>
+              <a:rPr lang="es-ES" sz="2500" dirty="0">
+                <a:solidFill>
+                  <a:srgbClr val="00000A"/>
+                </a:solidFill>
+                <a:uFill>
+                  <a:solidFill>
+                    <a:srgbClr val="00000A"/>
+                  </a:solidFill>
+                </a:uFill>
+                <a:latin typeface="Helvetica Neue"/>
+                <a:ea typeface="Helvetica Neue"/>
+                <a:cs typeface="Helvetica Neue"/>
+              </a:rPr>
+              <a:t>•	La SRS o documento de Especificación de Requisitos Software</a:t>
+            </a:r>
+          </a:p>
+          <a:p>
+            <a:r>
+              <a:rPr lang="es-ES" sz="2500" dirty="0">
+                <a:solidFill>
+                  <a:srgbClr val="00000A"/>
+                </a:solidFill>
+                <a:uFill>
+                  <a:solidFill>
+                    <a:srgbClr val="00000A"/>
+                  </a:solidFill>
+                </a:uFill>
+                <a:latin typeface="Helvetica Neue"/>
+                <a:ea typeface="Helvetica Neue"/>
+                <a:cs typeface="Helvetica Neue"/>
+              </a:rPr>
+              <a:t>•	El plan del proyecto</a:t>
+            </a:r>
+          </a:p>
+          <a:p>
+            <a:r>
+              <a:rPr lang="es-ES" sz="2500" dirty="0">
+                <a:solidFill>
+                  <a:srgbClr val="00000A"/>
+                </a:solidFill>
+                <a:uFill>
+                  <a:solidFill>
+                    <a:srgbClr val="00000A"/>
+                  </a:solidFill>
+                </a:uFill>
+                <a:latin typeface="Helvetica Neue"/>
+                <a:ea typeface="Helvetica Neue"/>
+                <a:cs typeface="Helvetica Neue"/>
+              </a:rPr>
+              <a:t>•	El diseño</a:t>
+            </a:r>
+          </a:p>
+          <a:p>
+            <a:r>
+              <a:rPr lang="es-ES" sz="2500" dirty="0">
+                <a:solidFill>
+                  <a:srgbClr val="00000A"/>
+                </a:solidFill>
+                <a:uFill>
+                  <a:solidFill>
+                    <a:srgbClr val="00000A"/>
+                  </a:solidFill>
+                </a:uFill>
+                <a:latin typeface="Helvetica Neue"/>
+                <a:ea typeface="Helvetica Neue"/>
+                <a:cs typeface="Helvetica Neue"/>
+              </a:rPr>
+              <a:t>•	El código</a:t>
+            </a:r>
+          </a:p>
+          <a:p>
+            <a:r>
+              <a:rPr lang="es-ES" sz="2500" dirty="0">
+                <a:solidFill>
+                  <a:srgbClr val="00000A"/>
+                </a:solidFill>
+                <a:uFill>
+                  <a:solidFill>
+                    <a:srgbClr val="00000A"/>
+                  </a:solidFill>
+                </a:uFill>
+                <a:latin typeface="Helvetica Neue"/>
+                <a:ea typeface="Helvetica Neue"/>
+                <a:cs typeface="Helvetica Neue"/>
+              </a:rPr>
+              <a:t>•	Los casos de prueba</a:t>
+            </a:r>
+          </a:p>
+          <a:p>
+            <a:r>
+              <a:rPr lang="es-ES" sz="2500" dirty="0">
+                <a:solidFill>
+                  <a:srgbClr val="00000A"/>
+                </a:solidFill>
+                <a:uFill>
+                  <a:solidFill>
+                    <a:srgbClr val="00000A"/>
+                  </a:solidFill>
+                </a:uFill>
+                <a:latin typeface="Helvetica Neue"/>
+                <a:ea typeface="Helvetica Neue"/>
+                <a:cs typeface="Helvetica Neue"/>
+              </a:rPr>
+              <a:t>•	Estándares y procedimientos de la Ingeniería del Software</a:t>
+            </a:r>
+          </a:p>
+          <a:p>
+            <a:r>
+              <a:rPr lang="es-ES" sz="2500" dirty="0">
+                <a:solidFill>
+                  <a:srgbClr val="00000A"/>
+                </a:solidFill>
+                <a:uFill>
+                  <a:solidFill>
+                    <a:srgbClr val="00000A"/>
+                  </a:solidFill>
+                </a:uFill>
+                <a:latin typeface="Helvetica Neue"/>
+                <a:ea typeface="Helvetica Neue"/>
+                <a:cs typeface="Helvetica Neue"/>
+              </a:rPr>
+              <a:t>•	El editor y el compilador</a:t>
+            </a:r>
+          </a:p>
+        </p:txBody>
+      </p:sp>
+    </p:spTree>
+    <p:extLst>
+      <p:ext uri="{BB962C8B-B14F-4D97-AF65-F5344CB8AC3E}">
+        <p14:creationId xmlns:p14="http://schemas.microsoft.com/office/powerpoint/2010/main" val="1459069435"/>
+      </p:ext>
+    </p:extLst>
+  </p:cSld>
+  <p:clrMapOvr>
+    <a:masterClrMapping/>
+  </p:clrMapOvr>
+  <p:transition spd="med"/>
+</p:sld>
+</file>
+
+<file path=ppt/slides/slide34.xml><?xml version="1.0" encoding="utf-8"?>
+<p:sld xmlns:a="http://schemas.openxmlformats.org/drawingml/2006/main" xmlns:r="http://schemas.openxmlformats.org/officeDocument/2006/relationships" xmlns:p="http://schemas.openxmlformats.org/presentationml/2006/main">
+  <p:cSld>
+    <p:spTree>
+      <p:nvGrpSpPr>
+        <p:cNvPr id="1" name=""/>
+        <p:cNvGrpSpPr/>
+        <p:nvPr/>
+      </p:nvGrpSpPr>
+      <p:grpSpPr>
+        <a:xfrm>
+          <a:off x="0" y="0"/>
+          <a:ext cx="0" cy="0"/>
+          <a:chOff x="0" y="0"/>
+          <a:chExt cx="0" cy="0"/>
+        </a:xfrm>
+      </p:grpSpPr>
+      <p:pic>
+        <p:nvPicPr>
+          <p:cNvPr id="194" name="pasted-image.tiff"/>
+          <p:cNvPicPr>
+            <a:picLocks noChangeAspect="1"/>
+          </p:cNvPicPr>
+          <p:nvPr/>
+        </p:nvPicPr>
+        <p:blipFill>
+          <a:blip r:embed="rId2">
+            <a:extLst/>
+          </a:blip>
+          <a:stretch>
+            <a:fillRect/>
+          </a:stretch>
+        </p:blipFill>
+        <p:spPr>
+          <a:xfrm>
+            <a:off x="-816206" y="-529723"/>
+            <a:ext cx="26829216" cy="2397845"/>
+          </a:xfrm>
+          <a:prstGeom prst="rect">
+            <a:avLst/>
+          </a:prstGeom>
+          <a:ln w="12700">
+            <a:miter lim="400000"/>
+          </a:ln>
+        </p:spPr>
+      </p:pic>
+      <p:pic>
+        <p:nvPicPr>
+          <p:cNvPr id="195" name="pasted-image.tiff"/>
+          <p:cNvPicPr>
+            <a:picLocks noChangeAspect="1"/>
+          </p:cNvPicPr>
+          <p:nvPr/>
+        </p:nvPicPr>
+        <p:blipFill>
+          <a:blip r:embed="rId3">
+            <a:extLst/>
+          </a:blip>
+          <a:stretch>
+            <a:fillRect/>
+          </a:stretch>
+        </p:blipFill>
+        <p:spPr>
+          <a:xfrm>
+            <a:off x="20120528" y="596900"/>
+            <a:ext cx="2416329" cy="766806"/>
+          </a:xfrm>
+          <a:prstGeom prst="rect">
+            <a:avLst/>
+          </a:prstGeom>
+          <a:ln w="12700">
+            <a:miter lim="400000"/>
+          </a:ln>
+        </p:spPr>
+      </p:pic>
+      <p:sp>
+        <p:nvSpPr>
+          <p:cNvPr id="197" name="Shape 197"/>
+          <p:cNvSpPr/>
+          <p:nvPr/>
+        </p:nvSpPr>
+        <p:spPr>
+          <a:xfrm>
+            <a:off x="1044066" y="500292"/>
+            <a:ext cx="10746532" cy="795089"/>
+          </a:xfrm>
+          <a:prstGeom prst="rect">
+            <a:avLst/>
+          </a:prstGeom>
+          <a:ln w="12700">
+            <a:miter lim="400000"/>
+          </a:ln>
+          <a:extLst>
+            <a:ext uri="{C572A759-6A51-4108-AA02-DFA0A04FC94B}">
+              <ma14:wrappingTextBoxFlag xmlns="" xmlns:ma14="http://schemas.microsoft.com/office/mac/drawingml/2011/main" val="1"/>
+            </a:ext>
+          </a:extLst>
+        </p:spPr>
+        <p:txBody>
+          <a:bodyPr wrap="none" lIns="50800" tIns="50800" rIns="50800" bIns="50800" anchor="ctr">
+            <a:spAutoFit/>
+          </a:bodyPr>
+          <a:lstStyle>
+            <a:lvl1pPr>
+              <a:defRPr sz="4500">
+                <a:solidFill>
+                  <a:srgbClr val="FFFFFF"/>
+                </a:solidFill>
+                <a:latin typeface="Helvetica Neue"/>
+                <a:ea typeface="Helvetica Neue"/>
+                <a:cs typeface="Helvetica Neue"/>
+                <a:sym typeface="Helvetica Neue"/>
+              </a:defRPr>
+            </a:lvl1pPr>
+          </a:lstStyle>
+          <a:p>
+            <a:r>
+              <a:rPr lang="es-ES" dirty="0"/>
+              <a:t>7. Mecanismos de seguimiento y control </a:t>
+            </a:r>
+            <a:endParaRPr dirty="0"/>
+          </a:p>
+        </p:txBody>
+      </p:sp>
+      <p:grpSp>
+        <p:nvGrpSpPr>
+          <p:cNvPr id="200" name="Group 200"/>
+          <p:cNvGrpSpPr/>
+          <p:nvPr/>
+        </p:nvGrpSpPr>
+        <p:grpSpPr>
+          <a:xfrm>
+            <a:off x="7895695" y="2577616"/>
+            <a:ext cx="12224833" cy="771400"/>
+            <a:chOff x="-3570269" y="2764547"/>
+            <a:chExt cx="19042766" cy="771399"/>
+          </a:xfrm>
+        </p:grpSpPr>
+        <p:sp>
+          <p:nvSpPr>
+            <p:cNvPr id="12" name="Shape 198"/>
+            <p:cNvSpPr/>
+            <p:nvPr/>
+          </p:nvSpPr>
+          <p:spPr>
+            <a:xfrm>
+              <a:off x="-3570269" y="2764547"/>
+              <a:ext cx="13823052" cy="771399"/>
+            </a:xfrm>
+            <a:prstGeom prst="roundRect">
+              <a:avLst>
+                <a:gd name="adj" fmla="val 33536"/>
+              </a:avLst>
+            </a:prstGeom>
+            <a:solidFill>
+              <a:srgbClr val="BA6B89"/>
+            </a:solidFill>
+            <a:ln w="12700" cap="flat">
+              <a:noFill/>
+              <a:miter lim="400000"/>
+            </a:ln>
+            <a:effectLst/>
+          </p:spPr>
+          <p:txBody>
+            <a:bodyPr wrap="square" lIns="50800" tIns="50800" rIns="50800" bIns="50800" numCol="1" anchor="ctr">
+              <a:noAutofit/>
+            </a:bodyPr>
+            <a:lstStyle/>
+            <a:p>
+              <a:pPr algn="ctr">
+                <a:lnSpc>
+                  <a:spcPct val="80000"/>
+                </a:lnSpc>
+                <a:spcBef>
+                  <a:spcPts val="0"/>
+                </a:spcBef>
+                <a:defRPr sz="4000" cap="all">
+                  <a:solidFill>
+                    <a:srgbClr val="FFFFFF"/>
+                  </a:solidFill>
+                  <a:latin typeface="+mn-lt"/>
+                  <a:ea typeface="+mn-ea"/>
+                  <a:cs typeface="+mn-cs"/>
+                  <a:sym typeface="DIN Condensed"/>
+                </a:defRPr>
+              </a:pPr>
+              <a:endParaRPr dirty="0"/>
+            </a:p>
+          </p:txBody>
+        </p:sp>
+        <p:sp>
+          <p:nvSpPr>
+            <p:cNvPr id="13" name="Shape 199"/>
+            <p:cNvSpPr/>
+            <p:nvPr/>
+          </p:nvSpPr>
+          <p:spPr>
+            <a:xfrm>
+              <a:off x="-3253212" y="2832791"/>
+              <a:ext cx="18725709" cy="564256"/>
+            </a:xfrm>
+            <a:prstGeom prst="rect">
+              <a:avLst/>
+            </a:prstGeom>
+            <a:noFill/>
+            <a:ln w="12700" cap="flat">
+              <a:noFill/>
+              <a:miter lim="400000"/>
+            </a:ln>
+            <a:effectLst/>
+            <a:extLst>
+              <a:ext uri="{C572A759-6A51-4108-AA02-DFA0A04FC94B}">
+                <ma14:wrappingTextBoxFlag xmlns="" xmlns:ma14="http://schemas.microsoft.com/office/mac/drawingml/2011/main" val="1"/>
+              </a:ext>
+            </a:extLst>
+          </p:spPr>
+          <p:txBody>
+            <a:bodyPr wrap="square" lIns="50800" tIns="50800" rIns="50800" bIns="50800" numCol="1" anchor="ctr">
+              <a:spAutoFit/>
+            </a:bodyPr>
+            <a:lstStyle>
+              <a:lvl1pPr>
+                <a:defRPr>
+                  <a:solidFill>
+                    <a:srgbClr val="FFFFFF"/>
+                  </a:solidFill>
+                </a:defRPr>
+              </a:lvl1pPr>
+            </a:lstStyle>
+            <a:p>
+              <a:r>
+                <a:rPr lang="es-ES" dirty="0"/>
+                <a:t>2.3 Criterios y protocolos para Nombrar los ECSs</a:t>
+              </a:r>
+              <a:endParaRPr dirty="0"/>
+            </a:p>
+          </p:txBody>
+        </p:sp>
+      </p:grpSp>
+      <p:sp>
+        <p:nvSpPr>
+          <p:cNvPr id="16" name="Shape 212"/>
+          <p:cNvSpPr/>
+          <p:nvPr/>
+        </p:nvSpPr>
+        <p:spPr>
+          <a:xfrm>
+            <a:off x="4457701" y="2291597"/>
+            <a:ext cx="16544924" cy="5249435"/>
+          </a:xfrm>
+          <a:prstGeom prst="roundRect">
+            <a:avLst>
+              <a:gd name="adj" fmla="val 7944"/>
+            </a:avLst>
+          </a:prstGeom>
+          <a:ln w="50800">
+            <a:solidFill>
+              <a:srgbClr val="5B5854"/>
+            </a:solidFill>
+            <a:miter lim="400000"/>
+          </a:ln>
+        </p:spPr>
+        <p:txBody>
+          <a:bodyPr lIns="50800" tIns="50800" rIns="50800" bIns="50800" anchor="ctr"/>
+          <a:lstStyle/>
+          <a:p>
+            <a:pPr algn="ctr">
+              <a:lnSpc>
+                <a:spcPct val="80000"/>
+              </a:lnSpc>
+              <a:spcBef>
+                <a:spcPts val="0"/>
+              </a:spcBef>
+              <a:defRPr sz="100" cap="all">
+                <a:solidFill>
+                  <a:srgbClr val="FFFFFF"/>
+                </a:solidFill>
+                <a:latin typeface="+mn-lt"/>
+                <a:ea typeface="+mn-ea"/>
+                <a:cs typeface="+mn-cs"/>
+                <a:sym typeface="DIN Condensed"/>
+              </a:defRPr>
+            </a:pPr>
+            <a:endParaRPr/>
+          </a:p>
+        </p:txBody>
+      </p:sp>
+      <p:sp>
+        <p:nvSpPr>
+          <p:cNvPr id="3" name="Marcador de número de diapositiva 2"/>
+          <p:cNvSpPr>
+            <a:spLocks noGrp="1"/>
+          </p:cNvSpPr>
+          <p:nvPr>
+            <p:ph type="sldNum" sz="quarter" idx="2"/>
+          </p:nvPr>
+        </p:nvSpPr>
+        <p:spPr/>
+        <p:txBody>
+          <a:bodyPr/>
+          <a:lstStyle/>
+          <a:p>
+            <a:fld id="{86CB4B4D-7CA3-9044-876B-883B54F8677D}" type="slidenum">
+              <a:rPr lang="es-ES" smtClean="0"/>
+              <a:t>34</a:t>
+            </a:fld>
+            <a:endParaRPr lang="es-ES"/>
+          </a:p>
+        </p:txBody>
+      </p:sp>
+      <p:sp>
+        <p:nvSpPr>
+          <p:cNvPr id="4" name="Rectángulo 3"/>
+          <p:cNvSpPr/>
+          <p:nvPr/>
+        </p:nvSpPr>
+        <p:spPr>
+          <a:xfrm>
+            <a:off x="7895695" y="3832324"/>
+            <a:ext cx="10226335" cy="3708708"/>
+          </a:xfrm>
+          <a:prstGeom prst="rect">
+            <a:avLst/>
+          </a:prstGeom>
+        </p:spPr>
+        <p:txBody>
+          <a:bodyPr wrap="square">
+            <a:spAutoFit/>
+          </a:bodyPr>
+          <a:lstStyle/>
+          <a:p>
+            <a:r>
+              <a:rPr lang="es-ES" sz="2500" dirty="0">
+                <a:solidFill>
+                  <a:srgbClr val="00000A"/>
+                </a:solidFill>
+                <a:uFill>
+                  <a:solidFill>
+                    <a:srgbClr val="00000A"/>
+                  </a:solidFill>
+                </a:uFill>
+                <a:latin typeface="Helvetica Neue"/>
+                <a:ea typeface="Helvetica Neue"/>
+                <a:cs typeface="Helvetica Neue"/>
+              </a:rPr>
+              <a:t>El criterio que se va a seguir para nombrar las versiones de cada elemento de la configuración es el siguiente:</a:t>
+            </a:r>
+          </a:p>
+          <a:p>
+            <a:r>
+              <a:rPr lang="es-ES" sz="2500" dirty="0" err="1">
+                <a:solidFill>
+                  <a:srgbClr val="00000A"/>
+                </a:solidFill>
+                <a:uFill>
+                  <a:solidFill>
+                    <a:srgbClr val="00000A"/>
+                  </a:solidFill>
+                </a:uFill>
+                <a:latin typeface="Helvetica Neue"/>
+                <a:ea typeface="Helvetica Neue"/>
+                <a:cs typeface="Helvetica Neue"/>
+              </a:rPr>
+              <a:t>vPrincipal.Secundario</a:t>
+            </a:r>
+            <a:endParaRPr lang="es-ES" sz="2500" dirty="0">
+              <a:solidFill>
+                <a:srgbClr val="00000A"/>
+              </a:solidFill>
+              <a:uFill>
+                <a:solidFill>
+                  <a:srgbClr val="00000A"/>
+                </a:solidFill>
+              </a:uFill>
+              <a:latin typeface="Helvetica Neue"/>
+              <a:ea typeface="Helvetica Neue"/>
+              <a:cs typeface="Helvetica Neue"/>
+            </a:endParaRPr>
+          </a:p>
+          <a:p>
+            <a:r>
+              <a:rPr lang="es-ES" sz="2500" dirty="0">
+                <a:solidFill>
+                  <a:srgbClr val="00000A"/>
+                </a:solidFill>
+                <a:uFill>
+                  <a:solidFill>
+                    <a:srgbClr val="00000A"/>
+                  </a:solidFill>
+                </a:uFill>
+                <a:latin typeface="Helvetica Neue"/>
+                <a:ea typeface="Helvetica Neue"/>
+                <a:cs typeface="Helvetica Neue"/>
+              </a:rPr>
+              <a:t>	Donde principal significa cambios notables y grandes dentro del elemento y Secundario los cambios pequeños.</a:t>
+            </a:r>
+          </a:p>
+          <a:p>
+            <a:endParaRPr lang="es-ES" sz="2500" dirty="0">
+              <a:solidFill>
+                <a:srgbClr val="00000A"/>
+              </a:solidFill>
+              <a:uFill>
+                <a:solidFill>
+                  <a:srgbClr val="00000A"/>
+                </a:solidFill>
+              </a:uFill>
+              <a:latin typeface="Helvetica Neue"/>
+              <a:ea typeface="Helvetica Neue"/>
+              <a:cs typeface="Helvetica Neue"/>
+            </a:endParaRPr>
+          </a:p>
+        </p:txBody>
+      </p:sp>
+      <p:grpSp>
+        <p:nvGrpSpPr>
+          <p:cNvPr id="14" name="Group 200"/>
+          <p:cNvGrpSpPr/>
+          <p:nvPr/>
+        </p:nvGrpSpPr>
+        <p:grpSpPr>
+          <a:xfrm>
+            <a:off x="5752570" y="8298997"/>
+            <a:ext cx="15670721" cy="771400"/>
+            <a:chOff x="-4646707" y="2737717"/>
+            <a:chExt cx="19042766" cy="771399"/>
+          </a:xfrm>
+        </p:grpSpPr>
+        <p:sp>
+          <p:nvSpPr>
+            <p:cNvPr id="15" name="Shape 198"/>
+            <p:cNvSpPr/>
+            <p:nvPr/>
+          </p:nvSpPr>
+          <p:spPr>
+            <a:xfrm>
+              <a:off x="-4646707" y="2737717"/>
+              <a:ext cx="17455143" cy="771399"/>
+            </a:xfrm>
+            <a:prstGeom prst="roundRect">
+              <a:avLst>
+                <a:gd name="adj" fmla="val 33536"/>
+              </a:avLst>
+            </a:prstGeom>
+            <a:solidFill>
+              <a:srgbClr val="BA6B89"/>
+            </a:solidFill>
+            <a:ln w="12700" cap="flat">
+              <a:noFill/>
+              <a:miter lim="400000"/>
+            </a:ln>
+            <a:effectLst/>
+          </p:spPr>
+          <p:txBody>
+            <a:bodyPr wrap="square" lIns="50800" tIns="50800" rIns="50800" bIns="50800" numCol="1" anchor="ctr">
+              <a:noAutofit/>
+            </a:bodyPr>
+            <a:lstStyle/>
+            <a:p>
+              <a:pPr algn="ctr">
+                <a:lnSpc>
+                  <a:spcPct val="80000"/>
+                </a:lnSpc>
+                <a:spcBef>
+                  <a:spcPts val="0"/>
+                </a:spcBef>
+                <a:defRPr sz="4000" cap="all">
+                  <a:solidFill>
+                    <a:srgbClr val="FFFFFF"/>
+                  </a:solidFill>
+                  <a:latin typeface="+mn-lt"/>
+                  <a:ea typeface="+mn-ea"/>
+                  <a:cs typeface="+mn-cs"/>
+                  <a:sym typeface="DIN Condensed"/>
+                </a:defRPr>
+              </a:pPr>
+              <a:endParaRPr dirty="0"/>
+            </a:p>
+          </p:txBody>
+        </p:sp>
+        <p:sp>
+          <p:nvSpPr>
+            <p:cNvPr id="17" name="Shape 199"/>
+            <p:cNvSpPr/>
+            <p:nvPr/>
+          </p:nvSpPr>
+          <p:spPr>
+            <a:xfrm>
+              <a:off x="-4329650" y="2805962"/>
+              <a:ext cx="18725709" cy="564256"/>
+            </a:xfrm>
+            <a:prstGeom prst="rect">
+              <a:avLst/>
+            </a:prstGeom>
+            <a:noFill/>
+            <a:ln w="12700" cap="flat">
+              <a:noFill/>
+              <a:miter lim="400000"/>
+            </a:ln>
+            <a:effectLst/>
+            <a:extLst>
+              <a:ext uri="{C572A759-6A51-4108-AA02-DFA0A04FC94B}">
+                <ma14:wrappingTextBoxFlag xmlns="" xmlns:ma14="http://schemas.microsoft.com/office/mac/drawingml/2011/main" val="1"/>
+              </a:ext>
+            </a:extLst>
+          </p:spPr>
+          <p:txBody>
+            <a:bodyPr wrap="square" lIns="50800" tIns="50800" rIns="50800" bIns="50800" numCol="1" anchor="ctr">
+              <a:spAutoFit/>
+            </a:bodyPr>
+            <a:lstStyle>
+              <a:lvl1pPr>
+                <a:defRPr>
+                  <a:solidFill>
+                    <a:srgbClr val="FFFFFF"/>
+                  </a:solidFill>
+                </a:defRPr>
+              </a:lvl1pPr>
+            </a:lstStyle>
+            <a:p>
+              <a:r>
+                <a:rPr lang="es-ES" dirty="0"/>
+                <a:t>2.4 Responsable de los procedimientos de GCS y de la creación de Líneas Base</a:t>
+              </a:r>
+              <a:endParaRPr dirty="0"/>
+            </a:p>
+          </p:txBody>
+        </p:sp>
+      </p:grpSp>
+      <p:sp>
+        <p:nvSpPr>
+          <p:cNvPr id="18" name="Shape 212"/>
+          <p:cNvSpPr/>
+          <p:nvPr/>
+        </p:nvSpPr>
+        <p:spPr>
+          <a:xfrm>
+            <a:off x="4457701" y="7982578"/>
+            <a:ext cx="16544924" cy="5249435"/>
+          </a:xfrm>
+          <a:prstGeom prst="roundRect">
+            <a:avLst>
+              <a:gd name="adj" fmla="val 7944"/>
+            </a:avLst>
+          </a:prstGeom>
+          <a:ln w="50800">
+            <a:solidFill>
+              <a:srgbClr val="5B5854"/>
+            </a:solidFill>
+            <a:miter lim="400000"/>
+          </a:ln>
+        </p:spPr>
+        <p:txBody>
+          <a:bodyPr lIns="50800" tIns="50800" rIns="50800" bIns="50800" anchor="ctr"/>
+          <a:lstStyle/>
+          <a:p>
+            <a:pPr algn="ctr">
+              <a:lnSpc>
+                <a:spcPct val="80000"/>
+              </a:lnSpc>
+              <a:spcBef>
+                <a:spcPts val="0"/>
+              </a:spcBef>
+              <a:defRPr sz="100" cap="all">
+                <a:solidFill>
+                  <a:srgbClr val="FFFFFF"/>
+                </a:solidFill>
+                <a:latin typeface="+mn-lt"/>
+                <a:ea typeface="+mn-ea"/>
+                <a:cs typeface="+mn-cs"/>
+                <a:sym typeface="DIN Condensed"/>
+              </a:defRPr>
+            </a:pPr>
+            <a:endParaRPr/>
+          </a:p>
+        </p:txBody>
+      </p:sp>
+      <p:sp>
+        <p:nvSpPr>
+          <p:cNvPr id="19" name="Rectángulo 18"/>
+          <p:cNvSpPr/>
+          <p:nvPr/>
+        </p:nvSpPr>
+        <p:spPr>
+          <a:xfrm>
+            <a:off x="7524220" y="9896607"/>
+            <a:ext cx="10820930" cy="2067233"/>
+          </a:xfrm>
+          <a:prstGeom prst="rect">
+            <a:avLst/>
+          </a:prstGeom>
+        </p:spPr>
+        <p:txBody>
+          <a:bodyPr wrap="square">
+            <a:spAutoFit/>
+          </a:bodyPr>
+          <a:lstStyle/>
+          <a:p>
+            <a:r>
+              <a:rPr lang="es-ES" sz="2500" dirty="0">
+                <a:solidFill>
+                  <a:srgbClr val="00000A"/>
+                </a:solidFill>
+                <a:uFill>
+                  <a:solidFill>
+                    <a:srgbClr val="00000A"/>
+                  </a:solidFill>
+                </a:uFill>
+                <a:latin typeface="Helvetica Neue"/>
+                <a:ea typeface="Helvetica Neue"/>
+                <a:cs typeface="Helvetica Neue"/>
+              </a:rPr>
+              <a:t>Las actividades las haremos de manera individual, y si en algún momento alguien ve necesario realizar un cambio o cierta duda que afecte al cómputo global, se discutirá ésta hasta llegar a un acuerdo.</a:t>
+            </a:r>
+          </a:p>
+          <a:p>
+            <a:r>
+              <a:rPr lang="es-ES" sz="2500" dirty="0">
+                <a:solidFill>
+                  <a:srgbClr val="00000A"/>
+                </a:solidFill>
+                <a:uFill>
+                  <a:solidFill>
+                    <a:srgbClr val="00000A"/>
+                  </a:solidFill>
+                </a:uFill>
+                <a:latin typeface="Helvetica Neue"/>
+                <a:ea typeface="Helvetica Neue"/>
+                <a:cs typeface="Helvetica Neue"/>
+              </a:rPr>
+              <a:t>Si ésta es aceptada, se seguirán los pasos para realizar dicho cambio.</a:t>
+            </a:r>
+          </a:p>
+        </p:txBody>
+      </p:sp>
+    </p:spTree>
+    <p:extLst>
+      <p:ext uri="{BB962C8B-B14F-4D97-AF65-F5344CB8AC3E}">
+        <p14:creationId xmlns:p14="http://schemas.microsoft.com/office/powerpoint/2010/main" val="169769778"/>
+      </p:ext>
+    </p:extLst>
+  </p:cSld>
+  <p:clrMapOvr>
+    <a:masterClrMapping/>
+  </p:clrMapOvr>
+  <p:transition spd="med"/>
+</p:sld>
+</file>
+
+<file path=ppt/slides/slide35.xml><?xml version="1.0" encoding="utf-8"?>
+<p:sld xmlns:a="http://schemas.openxmlformats.org/drawingml/2006/main" xmlns:r="http://schemas.openxmlformats.org/officeDocument/2006/relationships" xmlns:p="http://schemas.openxmlformats.org/presentationml/2006/main">
+  <p:cSld>
+    <p:spTree>
+      <p:nvGrpSpPr>
+        <p:cNvPr id="1" name=""/>
+        <p:cNvGrpSpPr/>
+        <p:nvPr/>
+      </p:nvGrpSpPr>
+      <p:grpSpPr>
+        <a:xfrm>
+          <a:off x="0" y="0"/>
+          <a:ext cx="0" cy="0"/>
+          <a:chOff x="0" y="0"/>
+          <a:chExt cx="0" cy="0"/>
+        </a:xfrm>
+      </p:grpSpPr>
+      <p:pic>
+        <p:nvPicPr>
+          <p:cNvPr id="194" name="pasted-image.tiff"/>
+          <p:cNvPicPr>
+            <a:picLocks noChangeAspect="1"/>
+          </p:cNvPicPr>
+          <p:nvPr/>
+        </p:nvPicPr>
+        <p:blipFill>
+          <a:blip r:embed="rId2">
+            <a:extLst/>
+          </a:blip>
+          <a:stretch>
+            <a:fillRect/>
+          </a:stretch>
+        </p:blipFill>
+        <p:spPr>
+          <a:xfrm>
+            <a:off x="-816206" y="-529723"/>
+            <a:ext cx="26829216" cy="2397845"/>
+          </a:xfrm>
+          <a:prstGeom prst="rect">
+            <a:avLst/>
+          </a:prstGeom>
+          <a:ln w="12700">
+            <a:miter lim="400000"/>
+          </a:ln>
+        </p:spPr>
+      </p:pic>
+      <p:pic>
+        <p:nvPicPr>
+          <p:cNvPr id="195" name="pasted-image.tiff"/>
+          <p:cNvPicPr>
+            <a:picLocks noChangeAspect="1"/>
+          </p:cNvPicPr>
+          <p:nvPr/>
+        </p:nvPicPr>
+        <p:blipFill>
+          <a:blip r:embed="rId3">
+            <a:extLst/>
+          </a:blip>
+          <a:stretch>
+            <a:fillRect/>
+          </a:stretch>
+        </p:blipFill>
+        <p:spPr>
+          <a:xfrm>
+            <a:off x="20120528" y="596900"/>
+            <a:ext cx="2416329" cy="766806"/>
+          </a:xfrm>
+          <a:prstGeom prst="rect">
+            <a:avLst/>
+          </a:prstGeom>
+          <a:ln w="12700">
+            <a:miter lim="400000"/>
+          </a:ln>
+        </p:spPr>
+      </p:pic>
+      <p:sp>
+        <p:nvSpPr>
+          <p:cNvPr id="197" name="Shape 197"/>
+          <p:cNvSpPr/>
+          <p:nvPr/>
+        </p:nvSpPr>
+        <p:spPr>
+          <a:xfrm>
+            <a:off x="1044066" y="500292"/>
+            <a:ext cx="10746532" cy="795089"/>
+          </a:xfrm>
+          <a:prstGeom prst="rect">
+            <a:avLst/>
+          </a:prstGeom>
+          <a:ln w="12700">
+            <a:miter lim="400000"/>
+          </a:ln>
+          <a:extLst>
+            <a:ext uri="{C572A759-6A51-4108-AA02-DFA0A04FC94B}">
+              <ma14:wrappingTextBoxFlag xmlns="" xmlns:ma14="http://schemas.microsoft.com/office/mac/drawingml/2011/main" val="1"/>
+            </a:ext>
+          </a:extLst>
+        </p:spPr>
+        <p:txBody>
+          <a:bodyPr wrap="none" lIns="50800" tIns="50800" rIns="50800" bIns="50800" anchor="ctr">
+            <a:spAutoFit/>
+          </a:bodyPr>
+          <a:lstStyle>
+            <a:lvl1pPr>
+              <a:defRPr sz="4500">
+                <a:solidFill>
+                  <a:srgbClr val="FFFFFF"/>
+                </a:solidFill>
+                <a:latin typeface="Helvetica Neue"/>
+                <a:ea typeface="Helvetica Neue"/>
+                <a:cs typeface="Helvetica Neue"/>
+                <a:sym typeface="Helvetica Neue"/>
+              </a:defRPr>
+            </a:lvl1pPr>
+          </a:lstStyle>
+          <a:p>
+            <a:r>
+              <a:rPr lang="es-ES" dirty="0"/>
+              <a:t>7. Mecanismos de seguimiento y control </a:t>
+            </a:r>
+            <a:endParaRPr dirty="0"/>
+          </a:p>
+        </p:txBody>
+      </p:sp>
+      <p:grpSp>
+        <p:nvGrpSpPr>
+          <p:cNvPr id="200" name="Group 200"/>
+          <p:cNvGrpSpPr/>
+          <p:nvPr/>
+        </p:nvGrpSpPr>
+        <p:grpSpPr>
+          <a:xfrm>
+            <a:off x="7067019" y="2604789"/>
+            <a:ext cx="12224834" cy="771400"/>
+            <a:chOff x="-4861108" y="2791720"/>
+            <a:chExt cx="19042768" cy="771399"/>
+          </a:xfrm>
+        </p:grpSpPr>
+        <p:sp>
+          <p:nvSpPr>
+            <p:cNvPr id="12" name="Shape 198"/>
+            <p:cNvSpPr/>
+            <p:nvPr/>
+          </p:nvSpPr>
+          <p:spPr>
+            <a:xfrm>
+              <a:off x="-4861108" y="2791720"/>
+              <a:ext cx="18146729" cy="771399"/>
+            </a:xfrm>
+            <a:prstGeom prst="roundRect">
+              <a:avLst>
+                <a:gd name="adj" fmla="val 33536"/>
+              </a:avLst>
+            </a:prstGeom>
+            <a:solidFill>
+              <a:srgbClr val="BA6B89"/>
+            </a:solidFill>
+            <a:ln w="12700" cap="flat">
+              <a:noFill/>
+              <a:miter lim="400000"/>
+            </a:ln>
+            <a:effectLst/>
+          </p:spPr>
+          <p:txBody>
+            <a:bodyPr wrap="square" lIns="50800" tIns="50800" rIns="50800" bIns="50800" numCol="1" anchor="ctr">
+              <a:noAutofit/>
+            </a:bodyPr>
+            <a:lstStyle/>
+            <a:p>
+              <a:pPr algn="ctr">
+                <a:lnSpc>
+                  <a:spcPct val="80000"/>
+                </a:lnSpc>
+                <a:spcBef>
+                  <a:spcPts val="0"/>
+                </a:spcBef>
+                <a:defRPr sz="4000" cap="all">
+                  <a:solidFill>
+                    <a:srgbClr val="FFFFFF"/>
+                  </a:solidFill>
+                  <a:latin typeface="+mn-lt"/>
+                  <a:ea typeface="+mn-ea"/>
+                  <a:cs typeface="+mn-cs"/>
+                  <a:sym typeface="DIN Condensed"/>
+                </a:defRPr>
+              </a:pPr>
+              <a:endParaRPr dirty="0"/>
+            </a:p>
+          </p:txBody>
+        </p:sp>
+        <p:sp>
+          <p:nvSpPr>
+            <p:cNvPr id="13" name="Shape 199"/>
+            <p:cNvSpPr/>
+            <p:nvPr/>
+          </p:nvSpPr>
+          <p:spPr>
+            <a:xfrm>
+              <a:off x="-4544048" y="2859963"/>
+              <a:ext cx="18725708" cy="564256"/>
+            </a:xfrm>
+            <a:prstGeom prst="rect">
+              <a:avLst/>
+            </a:prstGeom>
+            <a:noFill/>
+            <a:ln w="12700" cap="flat">
+              <a:noFill/>
+              <a:miter lim="400000"/>
+            </a:ln>
+            <a:effectLst/>
+            <a:extLst>
+              <a:ext uri="{C572A759-6A51-4108-AA02-DFA0A04FC94B}">
+                <ma14:wrappingTextBoxFlag xmlns="" xmlns:ma14="http://schemas.microsoft.com/office/mac/drawingml/2011/main" val="1"/>
+              </a:ext>
+            </a:extLst>
+          </p:spPr>
+          <p:txBody>
+            <a:bodyPr wrap="square" lIns="50800" tIns="50800" rIns="50800" bIns="50800" numCol="1" anchor="ctr">
+              <a:spAutoFit/>
+            </a:bodyPr>
+            <a:lstStyle>
+              <a:lvl1pPr>
+                <a:defRPr>
+                  <a:solidFill>
+                    <a:srgbClr val="FFFFFF"/>
+                  </a:solidFill>
+                </a:defRPr>
+              </a:lvl1pPr>
+            </a:lstStyle>
+            <a:p>
+              <a:r>
+                <a:rPr lang="es-ES" dirty="0"/>
+                <a:t>2.5 Políticas para el Control de Cambios y la Gestión de Versiones</a:t>
+              </a:r>
+              <a:endParaRPr dirty="0"/>
+            </a:p>
+          </p:txBody>
+        </p:sp>
+      </p:grpSp>
+      <p:sp>
+        <p:nvSpPr>
+          <p:cNvPr id="16" name="Shape 212"/>
+          <p:cNvSpPr/>
+          <p:nvPr/>
+        </p:nvSpPr>
+        <p:spPr>
+          <a:xfrm>
+            <a:off x="4457701" y="2291597"/>
+            <a:ext cx="16544924" cy="5249435"/>
+          </a:xfrm>
+          <a:prstGeom prst="roundRect">
+            <a:avLst>
+              <a:gd name="adj" fmla="val 7944"/>
+            </a:avLst>
+          </a:prstGeom>
+          <a:ln w="50800">
+            <a:solidFill>
+              <a:srgbClr val="5B5854"/>
+            </a:solidFill>
+            <a:miter lim="400000"/>
+          </a:ln>
+        </p:spPr>
+        <p:txBody>
+          <a:bodyPr lIns="50800" tIns="50800" rIns="50800" bIns="50800" anchor="ctr"/>
+          <a:lstStyle/>
+          <a:p>
+            <a:pPr algn="ctr">
+              <a:lnSpc>
+                <a:spcPct val="80000"/>
+              </a:lnSpc>
+              <a:spcBef>
+                <a:spcPts val="0"/>
+              </a:spcBef>
+              <a:defRPr sz="100" cap="all">
+                <a:solidFill>
+                  <a:srgbClr val="FFFFFF"/>
+                </a:solidFill>
+                <a:latin typeface="+mn-lt"/>
+                <a:ea typeface="+mn-ea"/>
+                <a:cs typeface="+mn-cs"/>
+                <a:sym typeface="DIN Condensed"/>
+              </a:defRPr>
+            </a:pPr>
+            <a:endParaRPr/>
+          </a:p>
+        </p:txBody>
+      </p:sp>
+      <p:sp>
+        <p:nvSpPr>
+          <p:cNvPr id="3" name="Marcador de número de diapositiva 2"/>
+          <p:cNvSpPr>
+            <a:spLocks noGrp="1"/>
+          </p:cNvSpPr>
+          <p:nvPr>
+            <p:ph type="sldNum" sz="quarter" idx="2"/>
+          </p:nvPr>
+        </p:nvSpPr>
+        <p:spPr/>
+        <p:txBody>
+          <a:bodyPr/>
+          <a:lstStyle/>
+          <a:p>
+            <a:fld id="{86CB4B4D-7CA3-9044-876B-883B54F8677D}" type="slidenum">
+              <a:rPr lang="es-ES" smtClean="0"/>
+              <a:t>35</a:t>
+            </a:fld>
+            <a:endParaRPr lang="es-ES"/>
+          </a:p>
+        </p:txBody>
+      </p:sp>
+      <p:sp>
+        <p:nvSpPr>
+          <p:cNvPr id="4" name="Rectángulo 3"/>
+          <p:cNvSpPr/>
+          <p:nvPr/>
+        </p:nvSpPr>
+        <p:spPr>
+          <a:xfrm>
+            <a:off x="7270561" y="3832324"/>
+            <a:ext cx="11446064" cy="3272691"/>
+          </a:xfrm>
+          <a:prstGeom prst="rect">
+            <a:avLst/>
+          </a:prstGeom>
+        </p:spPr>
+        <p:txBody>
+          <a:bodyPr wrap="square">
+            <a:spAutoFit/>
+          </a:bodyPr>
+          <a:lstStyle/>
+          <a:p>
+            <a:r>
+              <a:rPr lang="es-ES" sz="2500" dirty="0">
+                <a:solidFill>
+                  <a:srgbClr val="00000A"/>
+                </a:solidFill>
+                <a:uFill>
+                  <a:solidFill>
+                    <a:srgbClr val="00000A"/>
+                  </a:solidFill>
+                </a:uFill>
+                <a:latin typeface="Helvetica Neue"/>
+                <a:ea typeface="Helvetica Neue"/>
+                <a:cs typeface="Helvetica Neue"/>
+              </a:rPr>
+              <a:t>Protocolo para llegar a un acuerdo y los pasos a dar en caso de realizar un cambio: Si es necesario realizar el cambio y cómo afecta éste al resto del proyecto, discutiendo las posibilidades presentadas como respuesta a dicha propuesta.</a:t>
+            </a:r>
+          </a:p>
+          <a:p>
+            <a:r>
+              <a:rPr lang="es-ES" sz="2500" dirty="0">
+                <a:solidFill>
+                  <a:srgbClr val="00000A"/>
+                </a:solidFill>
+                <a:uFill>
+                  <a:solidFill>
+                    <a:srgbClr val="00000A"/>
+                  </a:solidFill>
+                </a:uFill>
+                <a:latin typeface="Helvetica Neue"/>
+                <a:ea typeface="Helvetica Neue"/>
+                <a:cs typeface="Helvetica Neue"/>
+              </a:rPr>
+              <a:t>Emplearemos la herramienta Git y un servidor Git.</a:t>
+            </a:r>
+          </a:p>
+          <a:p>
+            <a:endParaRPr lang="es-ES" sz="2500" dirty="0">
+              <a:solidFill>
+                <a:srgbClr val="00000A"/>
+              </a:solidFill>
+              <a:uFill>
+                <a:solidFill>
+                  <a:srgbClr val="00000A"/>
+                </a:solidFill>
+              </a:uFill>
+              <a:latin typeface="Helvetica Neue"/>
+              <a:ea typeface="Helvetica Neue"/>
+              <a:cs typeface="Helvetica Neue"/>
+            </a:endParaRPr>
+          </a:p>
+        </p:txBody>
+      </p:sp>
+      <p:grpSp>
+        <p:nvGrpSpPr>
+          <p:cNvPr id="14" name="Group 200"/>
+          <p:cNvGrpSpPr/>
+          <p:nvPr/>
+        </p:nvGrpSpPr>
+        <p:grpSpPr>
+          <a:xfrm>
+            <a:off x="8124295" y="8447931"/>
+            <a:ext cx="15670721" cy="771400"/>
+            <a:chOff x="-4646707" y="2737717"/>
+            <a:chExt cx="19042766" cy="771399"/>
+          </a:xfrm>
+        </p:grpSpPr>
+        <p:sp>
+          <p:nvSpPr>
+            <p:cNvPr id="15" name="Shape 198"/>
+            <p:cNvSpPr/>
+            <p:nvPr/>
+          </p:nvSpPr>
+          <p:spPr>
+            <a:xfrm>
+              <a:off x="-4646707" y="2737717"/>
+              <a:ext cx="11656267" cy="771399"/>
+            </a:xfrm>
+            <a:prstGeom prst="roundRect">
+              <a:avLst>
+                <a:gd name="adj" fmla="val 33536"/>
+              </a:avLst>
+            </a:prstGeom>
+            <a:solidFill>
+              <a:srgbClr val="BA6B89"/>
+            </a:solidFill>
+            <a:ln w="12700" cap="flat">
+              <a:noFill/>
+              <a:miter lim="400000"/>
+            </a:ln>
+            <a:effectLst/>
+          </p:spPr>
+          <p:txBody>
+            <a:bodyPr wrap="square" lIns="50800" tIns="50800" rIns="50800" bIns="50800" numCol="1" anchor="ctr">
+              <a:noAutofit/>
+            </a:bodyPr>
+            <a:lstStyle/>
+            <a:p>
+              <a:pPr algn="ctr">
+                <a:lnSpc>
+                  <a:spcPct val="80000"/>
+                </a:lnSpc>
+                <a:spcBef>
+                  <a:spcPts val="0"/>
+                </a:spcBef>
+                <a:defRPr sz="4000" cap="all">
+                  <a:solidFill>
+                    <a:srgbClr val="FFFFFF"/>
+                  </a:solidFill>
+                  <a:latin typeface="+mn-lt"/>
+                  <a:ea typeface="+mn-ea"/>
+                  <a:cs typeface="+mn-cs"/>
+                  <a:sym typeface="DIN Condensed"/>
+                </a:defRPr>
+              </a:pPr>
+              <a:endParaRPr dirty="0"/>
+            </a:p>
+          </p:txBody>
+        </p:sp>
+        <p:sp>
+          <p:nvSpPr>
+            <p:cNvPr id="17" name="Shape 199"/>
+            <p:cNvSpPr/>
+            <p:nvPr/>
+          </p:nvSpPr>
+          <p:spPr>
+            <a:xfrm>
+              <a:off x="-4329650" y="2805962"/>
+              <a:ext cx="18725709" cy="564256"/>
+            </a:xfrm>
+            <a:prstGeom prst="rect">
+              <a:avLst/>
+            </a:prstGeom>
+            <a:noFill/>
+            <a:ln w="12700" cap="flat">
+              <a:noFill/>
+              <a:miter lim="400000"/>
+            </a:ln>
+            <a:effectLst/>
+            <a:extLst>
+              <a:ext uri="{C572A759-6A51-4108-AA02-DFA0A04FC94B}">
+                <ma14:wrappingTextBoxFlag xmlns="" xmlns:ma14="http://schemas.microsoft.com/office/mac/drawingml/2011/main" val="1"/>
+              </a:ext>
+            </a:extLst>
+          </p:spPr>
+          <p:txBody>
+            <a:bodyPr wrap="square" lIns="50800" tIns="50800" rIns="50800" bIns="50800" numCol="1" anchor="ctr">
+              <a:spAutoFit/>
+            </a:bodyPr>
+            <a:lstStyle>
+              <a:lvl1pPr>
+                <a:defRPr>
+                  <a:solidFill>
+                    <a:srgbClr val="FFFFFF"/>
+                  </a:solidFill>
+                </a:defRPr>
+              </a:lvl1pPr>
+            </a:lstStyle>
+            <a:p>
+              <a:r>
+                <a:rPr lang="es-ES" dirty="0"/>
+                <a:t>2.6 Registros para mantener el rastro de los cambios </a:t>
+              </a:r>
+              <a:endParaRPr dirty="0"/>
+            </a:p>
+          </p:txBody>
+        </p:sp>
+      </p:grpSp>
+      <p:sp>
+        <p:nvSpPr>
+          <p:cNvPr id="18" name="Shape 212"/>
+          <p:cNvSpPr/>
+          <p:nvPr/>
+        </p:nvSpPr>
+        <p:spPr>
+          <a:xfrm>
+            <a:off x="4457701" y="7982578"/>
+            <a:ext cx="16544924" cy="5249435"/>
+          </a:xfrm>
+          <a:prstGeom prst="roundRect">
+            <a:avLst>
+              <a:gd name="adj" fmla="val 7944"/>
+            </a:avLst>
+          </a:prstGeom>
+          <a:ln w="50800">
+            <a:solidFill>
+              <a:srgbClr val="5B5854"/>
+            </a:solidFill>
+            <a:miter lim="400000"/>
+          </a:ln>
+        </p:spPr>
+        <p:txBody>
+          <a:bodyPr lIns="50800" tIns="50800" rIns="50800" bIns="50800" anchor="ctr"/>
+          <a:lstStyle/>
+          <a:p>
+            <a:pPr algn="ctr">
+              <a:lnSpc>
+                <a:spcPct val="80000"/>
+              </a:lnSpc>
+              <a:spcBef>
+                <a:spcPts val="0"/>
+              </a:spcBef>
+              <a:defRPr sz="100" cap="all">
+                <a:solidFill>
+                  <a:srgbClr val="FFFFFF"/>
+                </a:solidFill>
+                <a:latin typeface="+mn-lt"/>
+                <a:ea typeface="+mn-ea"/>
+                <a:cs typeface="+mn-cs"/>
+                <a:sym typeface="DIN Condensed"/>
+              </a:defRPr>
+            </a:pPr>
+            <a:endParaRPr/>
+          </a:p>
+        </p:txBody>
+      </p:sp>
+      <p:sp>
+        <p:nvSpPr>
+          <p:cNvPr id="19" name="Rectángulo 18"/>
+          <p:cNvSpPr/>
+          <p:nvPr/>
+        </p:nvSpPr>
+        <p:spPr>
+          <a:xfrm>
+            <a:off x="7583128" y="10671873"/>
+            <a:ext cx="10820930" cy="1246495"/>
+          </a:xfrm>
+          <a:prstGeom prst="rect">
+            <a:avLst/>
+          </a:prstGeom>
+        </p:spPr>
+        <p:txBody>
+          <a:bodyPr wrap="square">
+            <a:spAutoFit/>
+          </a:bodyPr>
+          <a:lstStyle/>
+          <a:p>
+            <a:r>
+              <a:rPr lang="es-ES" sz="2500" dirty="0">
+                <a:solidFill>
+                  <a:srgbClr val="00000A"/>
+                </a:solidFill>
+                <a:uFill>
+                  <a:solidFill>
+                    <a:srgbClr val="00000A"/>
+                  </a:solidFill>
+                </a:uFill>
+                <a:latin typeface="Helvetica Neue"/>
+                <a:ea typeface="Helvetica Neue"/>
+                <a:cs typeface="Helvetica Neue"/>
+              </a:rPr>
+              <a:t>La herramienta Git nos ofrece un historial de todos los cambios, así como una breve descripción, realizados en cada versión. Así mismo los datos de la persona que ha realizado dicho cambio, fecha y archivo.</a:t>
+            </a:r>
+          </a:p>
+        </p:txBody>
+      </p:sp>
+    </p:spTree>
+    <p:extLst>
+      <p:ext uri="{BB962C8B-B14F-4D97-AF65-F5344CB8AC3E}">
+        <p14:creationId xmlns:p14="http://schemas.microsoft.com/office/powerpoint/2010/main" val="4285071432"/>
       </p:ext>
     </p:extLst>
   </p:cSld>

</xml_diff>